<commit_message>
JK updated slides with new abstract counts and word counts
</commit_message>
<xml_diff>
--- a/2023_Second_analysis/Slides/Results_slides.pptx
+++ b/2023_Second_analysis/Slides/Results_slides.pptx
@@ -5,8 +5,10 @@
     <p:sldMasterId id="2147483648" r:id="rId1"/>
   </p:sldMasterIdLst>
   <p:sldIdLst>
-    <p:sldId id="257" r:id="rId2"/>
-    <p:sldId id="258" r:id="rId3"/>
+    <p:sldId id="259" r:id="rId2"/>
+    <p:sldId id="257" r:id="rId3"/>
+    <p:sldId id="260" r:id="rId4"/>
+    <p:sldId id="258" r:id="rId5"/>
   </p:sldIdLst>
   <p:sldSz cx="12192000" cy="6858000"/>
   <p:notesSz cx="6858000" cy="9144000"/>
@@ -262,7 +264,7 @@
           <a:p>
             <a:fld id="{6B2E31D3-D513-4509-92E7-11288EB68A6C}" type="datetimeFigureOut">
               <a:rPr lang="en-GB" smtClean="0"/>
-              <a:t>22/05/2023</a:t>
+              <a:t>31/05/2023</a:t>
             </a:fld>
             <a:endParaRPr lang="en-GB"/>
           </a:p>
@@ -462,7 +464,7 @@
           <a:p>
             <a:fld id="{6B2E31D3-D513-4509-92E7-11288EB68A6C}" type="datetimeFigureOut">
               <a:rPr lang="en-GB" smtClean="0"/>
-              <a:t>22/05/2023</a:t>
+              <a:t>31/05/2023</a:t>
             </a:fld>
             <a:endParaRPr lang="en-GB"/>
           </a:p>
@@ -672,7 +674,7 @@
           <a:p>
             <a:fld id="{6B2E31D3-D513-4509-92E7-11288EB68A6C}" type="datetimeFigureOut">
               <a:rPr lang="en-GB" smtClean="0"/>
-              <a:t>22/05/2023</a:t>
+              <a:t>31/05/2023</a:t>
             </a:fld>
             <a:endParaRPr lang="en-GB"/>
           </a:p>
@@ -872,7 +874,7 @@
           <a:p>
             <a:fld id="{6B2E31D3-D513-4509-92E7-11288EB68A6C}" type="datetimeFigureOut">
               <a:rPr lang="en-GB" smtClean="0"/>
-              <a:t>22/05/2023</a:t>
+              <a:t>31/05/2023</a:t>
             </a:fld>
             <a:endParaRPr lang="en-GB"/>
           </a:p>
@@ -1148,7 +1150,7 @@
           <a:p>
             <a:fld id="{6B2E31D3-D513-4509-92E7-11288EB68A6C}" type="datetimeFigureOut">
               <a:rPr lang="en-GB" smtClean="0"/>
-              <a:t>22/05/2023</a:t>
+              <a:t>31/05/2023</a:t>
             </a:fld>
             <a:endParaRPr lang="en-GB"/>
           </a:p>
@@ -1416,7 +1418,7 @@
           <a:p>
             <a:fld id="{6B2E31D3-D513-4509-92E7-11288EB68A6C}" type="datetimeFigureOut">
               <a:rPr lang="en-GB" smtClean="0"/>
-              <a:t>22/05/2023</a:t>
+              <a:t>31/05/2023</a:t>
             </a:fld>
             <a:endParaRPr lang="en-GB"/>
           </a:p>
@@ -1831,7 +1833,7 @@
           <a:p>
             <a:fld id="{6B2E31D3-D513-4509-92E7-11288EB68A6C}" type="datetimeFigureOut">
               <a:rPr lang="en-GB" smtClean="0"/>
-              <a:t>22/05/2023</a:t>
+              <a:t>31/05/2023</a:t>
             </a:fld>
             <a:endParaRPr lang="en-GB"/>
           </a:p>
@@ -1973,7 +1975,7 @@
           <a:p>
             <a:fld id="{6B2E31D3-D513-4509-92E7-11288EB68A6C}" type="datetimeFigureOut">
               <a:rPr lang="en-GB" smtClean="0"/>
-              <a:t>22/05/2023</a:t>
+              <a:t>31/05/2023</a:t>
             </a:fld>
             <a:endParaRPr lang="en-GB"/>
           </a:p>
@@ -2086,7 +2088,7 @@
           <a:p>
             <a:fld id="{6B2E31D3-D513-4509-92E7-11288EB68A6C}" type="datetimeFigureOut">
               <a:rPr lang="en-GB" smtClean="0"/>
-              <a:t>22/05/2023</a:t>
+              <a:t>31/05/2023</a:t>
             </a:fld>
             <a:endParaRPr lang="en-GB"/>
           </a:p>
@@ -2399,7 +2401,7 @@
           <a:p>
             <a:fld id="{6B2E31D3-D513-4509-92E7-11288EB68A6C}" type="datetimeFigureOut">
               <a:rPr lang="en-GB" smtClean="0"/>
-              <a:t>22/05/2023</a:t>
+              <a:t>31/05/2023</a:t>
             </a:fld>
             <a:endParaRPr lang="en-GB"/>
           </a:p>
@@ -2688,7 +2690,7 @@
           <a:p>
             <a:fld id="{6B2E31D3-D513-4509-92E7-11288EB68A6C}" type="datetimeFigureOut">
               <a:rPr lang="en-GB" smtClean="0"/>
-              <a:t>22/05/2023</a:t>
+              <a:t>31/05/2023</a:t>
             </a:fld>
             <a:endParaRPr lang="en-GB"/>
           </a:p>
@@ -2931,7 +2933,7 @@
           <a:p>
             <a:fld id="{6B2E31D3-D513-4509-92E7-11288EB68A6C}" type="datetimeFigureOut">
               <a:rPr lang="en-GB" smtClean="0"/>
-              <a:t>22/05/2023</a:t>
+              <a:t>31/05/2023</a:t>
             </a:fld>
             <a:endParaRPr lang="en-GB"/>
           </a:p>
@@ -3353,6 +3355,113 @@
           <p:cNvPr id="2" name="Title 1">
             <a:extLst>
               <a:ext uri="{FF2B5EF4-FFF2-40B4-BE49-F238E27FC236}">
+                <a16:creationId xmlns:a16="http://schemas.microsoft.com/office/drawing/2014/main" id="{52E08F55-413D-A962-97DB-7B1FA781C65A}"/>
+              </a:ext>
+            </a:extLst>
+          </p:cNvPr>
+          <p:cNvSpPr>
+            <a:spLocks noGrp="1"/>
+          </p:cNvSpPr>
+          <p:nvPr>
+            <p:ph type="title"/>
+          </p:nvPr>
+        </p:nvSpPr>
+        <p:spPr/>
+        <p:txBody>
+          <a:bodyPr/>
+          <a:lstStyle/>
+          <a:p>
+            <a:r>
+              <a:rPr lang="en-GB" dirty="0"/>
+              <a:t>Number of abstracts over the years</a:t>
+            </a:r>
+          </a:p>
+        </p:txBody>
+      </p:sp>
+      <p:pic>
+        <p:nvPicPr>
+          <p:cNvPr id="1026" name="Picture 2">
+            <a:extLst>
+              <a:ext uri="{FF2B5EF4-FFF2-40B4-BE49-F238E27FC236}">
+                <a16:creationId xmlns:a16="http://schemas.microsoft.com/office/drawing/2014/main" id="{BE728349-ACDD-9DEA-09F8-AFD06225DDD5}"/>
+              </a:ext>
+            </a:extLst>
+          </p:cNvPr>
+          <p:cNvPicPr>
+            <a:picLocks noGrp="1" noChangeAspect="1" noChangeArrowheads="1"/>
+          </p:cNvPicPr>
+          <p:nvPr>
+            <p:ph idx="1"/>
+          </p:nvPr>
+        </p:nvPicPr>
+        <p:blipFill>
+          <a:blip r:embed="rId2">
+            <a:extLst>
+              <a:ext uri="{28A0092B-C50C-407E-A947-70E740481C1C}">
+                <a14:useLocalDpi xmlns:a14="http://schemas.microsoft.com/office/drawing/2010/main" val="0"/>
+              </a:ext>
+            </a:extLst>
+          </a:blip>
+          <a:srcRect/>
+          <a:stretch>
+            <a:fillRect/>
+          </a:stretch>
+        </p:blipFill>
+        <p:spPr bwMode="auto">
+          <a:xfrm>
+            <a:off x="3535675" y="2026186"/>
+            <a:ext cx="5120650" cy="3950216"/>
+          </a:xfrm>
+          <a:prstGeom prst="rect">
+            <a:avLst/>
+          </a:prstGeom>
+          <a:noFill/>
+          <a:extLst>
+            <a:ext uri="{909E8E84-426E-40DD-AFC4-6F175D3DCCD1}">
+              <a14:hiddenFill xmlns:a14="http://schemas.microsoft.com/office/drawing/2010/main">
+                <a:solidFill>
+                  <a:srgbClr val="FFFFFF"/>
+                </a:solidFill>
+              </a14:hiddenFill>
+            </a:ext>
+          </a:extLst>
+        </p:spPr>
+      </p:pic>
+    </p:spTree>
+    <p:extLst>
+      <p:ext uri="{BB962C8B-B14F-4D97-AF65-F5344CB8AC3E}">
+        <p14:creationId xmlns:p14="http://schemas.microsoft.com/office/powerpoint/2010/main" val="3558654841"/>
+      </p:ext>
+    </p:extLst>
+  </p:cSld>
+  <p:clrMapOvr>
+    <a:masterClrMapping/>
+  </p:clrMapOvr>
+</p:sld>
+</file>
+
+<file path=ppt/slides/slide2.xml><?xml version="1.0" encoding="utf-8"?>
+<p:sld xmlns:a="http://schemas.openxmlformats.org/drawingml/2006/main" xmlns:r="http://schemas.openxmlformats.org/officeDocument/2006/relationships" xmlns:p="http://schemas.openxmlformats.org/presentationml/2006/main">
+  <p:cSld>
+    <p:spTree>
+      <p:nvGrpSpPr>
+        <p:cNvPr id="1" name=""/>
+        <p:cNvGrpSpPr/>
+        <p:nvPr/>
+      </p:nvGrpSpPr>
+      <p:grpSpPr>
+        <a:xfrm>
+          <a:off x="0" y="0"/>
+          <a:ext cx="0" cy="0"/>
+          <a:chOff x="0" y="0"/>
+          <a:chExt cx="0" cy="0"/>
+        </a:xfrm>
+      </p:grpSpPr>
+      <p:sp>
+        <p:nvSpPr>
+          <p:cNvPr id="2" name="Title 1">
+            <a:extLst>
+              <a:ext uri="{FF2B5EF4-FFF2-40B4-BE49-F238E27FC236}">
                 <a16:creationId xmlns:a16="http://schemas.microsoft.com/office/drawing/2014/main" id="{8061C0A1-3FB6-CB72-E2CE-D7D9AA4B012B}"/>
               </a:ext>
             </a:extLst>
@@ -3391,14 +3500,14 @@
           <p:nvPr>
             <p:extLst>
               <p:ext uri="{D42A27DB-BD31-4B8C-83A1-F6EECF244321}">
-                <p14:modId xmlns:p14="http://schemas.microsoft.com/office/powerpoint/2010/main" val="924727632"/>
+                <p14:modId xmlns:p14="http://schemas.microsoft.com/office/powerpoint/2010/main" val="1817860207"/>
               </p:ext>
             </p:extLst>
           </p:nvPr>
         </p:nvGraphicFramePr>
         <p:xfrm>
-          <a:off x="440547" y="2036396"/>
-          <a:ext cx="11407294" cy="3035300"/>
+          <a:off x="202540" y="1825380"/>
+          <a:ext cx="11786920" cy="4294066"/>
         </p:xfrm>
         <a:graphic>
           <a:graphicData uri="http://schemas.openxmlformats.org/drawingml/2006/table">
@@ -3407,106 +3516,85 @@
                 <a:tableStyleId>{5C22544A-7EE6-4342-B048-85BDC9FD1C3A}</a:tableStyleId>
               </a:tblPr>
               <a:tblGrid>
-                <a:gridCol w="979210">
+                <a:gridCol w="1279756">
                   <a:extLst>
                     <a:ext uri="{9D8B030D-6E8A-4147-A177-3AD203B41FA5}">
                       <a16:colId xmlns:a16="http://schemas.microsoft.com/office/drawing/2014/main" val="2406688920"/>
                     </a:ext>
                   </a:extLst>
                 </a:gridCol>
-                <a:gridCol w="693103">
+                <a:gridCol w="1006507">
                   <a:extLst>
                     <a:ext uri="{9D8B030D-6E8A-4147-A177-3AD203B41FA5}">
                       <a16:colId xmlns:a16="http://schemas.microsoft.com/office/drawing/2014/main" val="3603177584"/>
                     </a:ext>
                   </a:extLst>
                 </a:gridCol>
-                <a:gridCol w="737553">
+                <a:gridCol w="1071022">
                   <a:extLst>
                     <a:ext uri="{9D8B030D-6E8A-4147-A177-3AD203B41FA5}">
                       <a16:colId xmlns:a16="http://schemas.microsoft.com/office/drawing/2014/main" val="410188219"/>
                     </a:ext>
                   </a:extLst>
                 </a:gridCol>
-                <a:gridCol w="752475">
+                <a:gridCol w="1001936">
                   <a:extLst>
                     <a:ext uri="{9D8B030D-6E8A-4147-A177-3AD203B41FA5}">
                       <a16:colId xmlns:a16="http://schemas.microsoft.com/office/drawing/2014/main" val="2297954957"/>
                     </a:ext>
                   </a:extLst>
                 </a:gridCol>
-                <a:gridCol w="912178">
+                <a:gridCol w="1024498">
                   <a:extLst>
                     <a:ext uri="{9D8B030D-6E8A-4147-A177-3AD203B41FA5}">
                       <a16:colId xmlns:a16="http://schemas.microsoft.com/office/drawing/2014/main" val="3369176656"/>
                     </a:ext>
                   </a:extLst>
                 </a:gridCol>
-                <a:gridCol w="690944">
+                <a:gridCol w="1093068">
                   <a:extLst>
                     <a:ext uri="{9D8B030D-6E8A-4147-A177-3AD203B41FA5}">
                       <a16:colId xmlns:a16="http://schemas.microsoft.com/office/drawing/2014/main" val="1457118934"/>
                     </a:ext>
                   </a:extLst>
                 </a:gridCol>
-                <a:gridCol w="708406">
+                <a:gridCol w="1318981">
                   <a:extLst>
                     <a:ext uri="{9D8B030D-6E8A-4147-A177-3AD203B41FA5}">
                       <a16:colId xmlns:a16="http://schemas.microsoft.com/office/drawing/2014/main" val="869975608"/>
                     </a:ext>
                   </a:extLst>
                 </a:gridCol>
-                <a:gridCol w="615950">
+                <a:gridCol w="892444">
                   <a:extLst>
                     <a:ext uri="{9D8B030D-6E8A-4147-A177-3AD203B41FA5}">
                       <a16:colId xmlns:a16="http://schemas.microsoft.com/office/drawing/2014/main" val="1626709284"/>
                     </a:ext>
                   </a:extLst>
                 </a:gridCol>
-                <a:gridCol w="1180973">
+                <a:gridCol w="1001936">
                   <a:extLst>
                     <a:ext uri="{9D8B030D-6E8A-4147-A177-3AD203B41FA5}">
                       <a16:colId xmlns:a16="http://schemas.microsoft.com/office/drawing/2014/main" val="2610771739"/>
                     </a:ext>
                   </a:extLst>
                 </a:gridCol>
-                <a:gridCol w="755333">
+                <a:gridCol w="1097712">
                   <a:extLst>
                     <a:ext uri="{9D8B030D-6E8A-4147-A177-3AD203B41FA5}">
                       <a16:colId xmlns:a16="http://schemas.microsoft.com/office/drawing/2014/main" val="88834686"/>
                     </a:ext>
                   </a:extLst>
                 </a:gridCol>
-                <a:gridCol w="648462">
+                <a:gridCol w="999060">
                   <a:extLst>
                     <a:ext uri="{9D8B030D-6E8A-4147-A177-3AD203B41FA5}">
                       <a16:colId xmlns:a16="http://schemas.microsoft.com/office/drawing/2014/main" val="3357239286"/>
                     </a:ext>
                   </a:extLst>
                 </a:gridCol>
-                <a:gridCol w="664083">
-                  <a:extLst>
-                    <a:ext uri="{9D8B030D-6E8A-4147-A177-3AD203B41FA5}">
-                      <a16:colId xmlns:a16="http://schemas.microsoft.com/office/drawing/2014/main" val="1000004313"/>
-                    </a:ext>
-                  </a:extLst>
-                </a:gridCol>
-                <a:gridCol w="1134936">
-                  <a:extLst>
-                    <a:ext uri="{9D8B030D-6E8A-4147-A177-3AD203B41FA5}">
-                      <a16:colId xmlns:a16="http://schemas.microsoft.com/office/drawing/2014/main" val="685521391"/>
-                    </a:ext>
-                  </a:extLst>
-                </a:gridCol>
-                <a:gridCol w="933688">
-                  <a:extLst>
-                    <a:ext uri="{9D8B030D-6E8A-4147-A177-3AD203B41FA5}">
-                      <a16:colId xmlns:a16="http://schemas.microsoft.com/office/drawing/2014/main" val="778782626"/>
-                    </a:ext>
-                  </a:extLst>
-                </a:gridCol>
               </a:tblGrid>
-              <a:tr h="908050">
+              <a:tr h="1284627">
                 <a:tc>
                   <a:txBody>
                     <a:bodyPr/>
@@ -3514,12 +3602,12 @@
                     <a:p>
                       <a:pPr algn="l" rtl="0" fontAlgn="ctr"/>
                       <a:r>
-                        <a:rPr lang="en-GB" sz="1600" u="none" strike="noStrike" dirty="0">
-                          <a:effectLst/>
-                        </a:rPr>
-                        <a:t>All</a:t>
-                      </a:r>
-                      <a:endParaRPr lang="en-GB" sz="1600" b="1" i="0" u="none" strike="noStrike" dirty="0">
+                        <a:rPr lang="en-GB" sz="2300" u="none" strike="noStrike" dirty="0">
+                          <a:effectLst/>
+                        </a:rPr>
+                        <a:t>All abstracts</a:t>
+                      </a:r>
+                      <a:endParaRPr lang="en-GB" sz="2300" b="1" i="0" u="none" strike="noStrike" dirty="0">
                         <a:solidFill>
                           <a:srgbClr val="FFFFFF"/>
                         </a:solidFill>
@@ -3528,21 +3616,21 @@
                       </a:endParaRPr>
                     </a:p>
                   </a:txBody>
-                  <a:tcPr marL="6350" marR="6350" marT="6350" marB="0" anchor="ctr"/>
+                  <a:tcPr marL="7373" marR="7373" marT="7373" marB="0" anchor="ctr"/>
                 </a:tc>
                 <a:tc>
                   <a:txBody>
                     <a:bodyPr/>
                     <a:lstStyle/>
                     <a:p>
-                      <a:pPr algn="l" rtl="0" fontAlgn="ctr"/>
-                      <a:r>
-                        <a:rPr lang="en-GB" sz="1600" u="none" strike="noStrike" dirty="0">
+                      <a:pPr algn="ctr" rtl="0" fontAlgn="ctr"/>
+                      <a:r>
+                        <a:rPr lang="en-GB" sz="2300" u="none" strike="noStrike" dirty="0">
                           <a:effectLst/>
                         </a:rPr>
                         <a:t>'gene'</a:t>
                       </a:r>
-                      <a:endParaRPr lang="en-GB" sz="1600" b="0" i="0" u="none" strike="noStrike" dirty="0">
+                      <a:endParaRPr lang="en-GB" sz="2300" b="0" i="0" u="none" strike="noStrike" dirty="0">
                         <a:solidFill>
                           <a:srgbClr val="000000"/>
                         </a:solidFill>
@@ -3551,21 +3639,21 @@
                       </a:endParaRPr>
                     </a:p>
                   </a:txBody>
-                  <a:tcPr marL="6350" marR="6350" marT="6350" marB="0" anchor="ctr"/>
+                  <a:tcPr marL="7373" marR="7373" marT="7373" marB="0" anchor="ctr"/>
                 </a:tc>
                 <a:tc>
                   <a:txBody>
                     <a:bodyPr/>
                     <a:lstStyle/>
                     <a:p>
-                      <a:pPr algn="l" rtl="0" fontAlgn="ctr"/>
-                      <a:r>
-                        <a:rPr lang="en-GB" sz="1600" u="none" strike="noStrike" dirty="0">
+                      <a:pPr algn="ctr" rtl="0" fontAlgn="ctr"/>
+                      <a:r>
+                        <a:rPr lang="en-GB" sz="2300" u="none" strike="noStrike" dirty="0">
                           <a:effectLst/>
                         </a:rPr>
                         <a:t>'patient'</a:t>
                       </a:r>
-                      <a:endParaRPr lang="en-GB" sz="1600" b="0" i="0" u="none" strike="noStrike" dirty="0">
+                      <a:endParaRPr lang="en-GB" sz="2300" b="0" i="0" u="none" strike="noStrike" dirty="0">
                         <a:solidFill>
                           <a:srgbClr val="000000"/>
                         </a:solidFill>
@@ -3574,33 +3662,33 @@
                       </a:endParaRPr>
                     </a:p>
                   </a:txBody>
-                  <a:tcPr marL="6350" marR="6350" marT="6350" marB="0" anchor="ctr"/>
+                  <a:tcPr marL="7373" marR="7373" marT="7373" marB="0" anchor="ctr"/>
                 </a:tc>
                 <a:tc>
                   <a:txBody>
                     <a:bodyPr/>
                     <a:lstStyle/>
                     <a:p>
-                      <a:pPr algn="l" rtl="0" fontAlgn="ctr"/>
-                      <a:r>
-                        <a:rPr lang="en-GB" sz="1600" u="none" strike="noStrike" dirty="0">
+                      <a:pPr algn="ctr" rtl="0" fontAlgn="ctr"/>
+                      <a:r>
+                        <a:rPr lang="en-GB" sz="2300" u="none" strike="noStrike" dirty="0">
                           <a:effectLst/>
                         </a:rPr>
                         <a:t>'</a:t>
                       </a:r>
                       <a:r>
-                        <a:rPr lang="en-GB" sz="1600" u="none" strike="noStrike" dirty="0" err="1">
+                        <a:rPr lang="en-GB" sz="2300" u="none" strike="noStrike" dirty="0" err="1">
                           <a:effectLst/>
                         </a:rPr>
                         <a:t>mutat</a:t>
                       </a:r>
                       <a:r>
-                        <a:rPr lang="en-GB" sz="1600" u="none" strike="noStrike" dirty="0">
+                        <a:rPr lang="en-GB" sz="2300" u="none" strike="noStrike" dirty="0">
                           <a:effectLst/>
                         </a:rPr>
                         <a:t>' </a:t>
                       </a:r>
-                      <a:endParaRPr lang="en-GB" sz="1600" b="0" i="0" u="none" strike="noStrike" dirty="0">
+                      <a:endParaRPr lang="en-GB" sz="2300" b="0" i="0" u="none" strike="noStrike" dirty="0">
                         <a:solidFill>
                           <a:srgbClr val="000000"/>
                         </a:solidFill>
@@ -3609,21 +3697,21 @@
                       </a:endParaRPr>
                     </a:p>
                   </a:txBody>
-                  <a:tcPr marL="6350" marR="6350" marT="6350" marB="0" anchor="ctr"/>
+                  <a:tcPr marL="7373" marR="7373" marT="7373" marB="0" anchor="ctr"/>
                 </a:tc>
                 <a:tc>
                   <a:txBody>
                     <a:bodyPr/>
                     <a:lstStyle/>
                     <a:p>
-                      <a:pPr algn="l" rtl="0" fontAlgn="ctr"/>
-                      <a:r>
-                        <a:rPr lang="en-GB" sz="1600" u="none" strike="noStrike" dirty="0">
+                      <a:pPr algn="ctr" rtl="0" fontAlgn="ctr"/>
+                      <a:r>
+                        <a:rPr lang="en-GB" sz="2300" u="none" strike="noStrike" dirty="0">
                           <a:effectLst/>
                         </a:rPr>
                         <a:t>'genet' </a:t>
                       </a:r>
-                      <a:endParaRPr lang="en-GB" sz="1600" b="0" i="0" u="none" strike="noStrike" dirty="0">
+                      <a:endParaRPr lang="en-GB" sz="2300" b="0" i="0" u="none" strike="noStrike" dirty="0">
                         <a:solidFill>
                           <a:srgbClr val="000000"/>
                         </a:solidFill>
@@ -3632,33 +3720,33 @@
                       </a:endParaRPr>
                     </a:p>
                   </a:txBody>
-                  <a:tcPr marL="6350" marR="6350" marT="6350" marB="0" anchor="ctr"/>
+                  <a:tcPr marL="7373" marR="7373" marT="7373" marB="0" anchor="ctr"/>
                 </a:tc>
                 <a:tc>
                   <a:txBody>
                     <a:bodyPr/>
                     <a:lstStyle/>
                     <a:p>
-                      <a:pPr algn="l" rtl="0" fontAlgn="ctr"/>
-                      <a:r>
-                        <a:rPr lang="en-GB" sz="1600" u="none" strike="noStrike" dirty="0">
+                      <a:pPr algn="ctr" rtl="0" fontAlgn="ctr"/>
+                      <a:r>
+                        <a:rPr lang="en-GB" sz="2300" u="none" strike="noStrike" dirty="0">
                           <a:effectLst/>
                         </a:rPr>
                         <a:t>'</a:t>
                       </a:r>
                       <a:r>
-                        <a:rPr lang="en-GB" sz="1600" u="none" strike="noStrike" dirty="0" err="1">
+                        <a:rPr lang="en-GB" sz="2300" u="none" strike="noStrike" dirty="0" err="1">
                           <a:effectLst/>
                         </a:rPr>
                         <a:t>studi</a:t>
                       </a:r>
                       <a:r>
-                        <a:rPr lang="en-GB" sz="1600" u="none" strike="noStrike" dirty="0">
+                        <a:rPr lang="en-GB" sz="2300" u="none" strike="noStrike" dirty="0">
                           <a:effectLst/>
                         </a:rPr>
                         <a:t>' </a:t>
                       </a:r>
-                      <a:endParaRPr lang="en-GB" sz="1600" b="0" i="0" u="none" strike="noStrike" dirty="0">
+                      <a:endParaRPr lang="en-GB" sz="2300" b="0" i="0" u="none" strike="noStrike" dirty="0">
                         <a:solidFill>
                           <a:srgbClr val="000000"/>
                         </a:solidFill>
@@ -3667,21 +3755,21 @@
                       </a:endParaRPr>
                     </a:p>
                   </a:txBody>
-                  <a:tcPr marL="6350" marR="6350" marT="6350" marB="0" anchor="ctr"/>
+                  <a:tcPr marL="7373" marR="7373" marT="7373" marB="0" anchor="ctr"/>
                 </a:tc>
                 <a:tc>
                   <a:txBody>
                     <a:bodyPr/>
                     <a:lstStyle/>
                     <a:p>
-                      <a:pPr algn="l" rtl="0" fontAlgn="ctr"/>
-                      <a:r>
-                        <a:rPr lang="en-GB" sz="1600" u="none" strike="noStrike" dirty="0">
+                      <a:pPr algn="ctr" rtl="0" fontAlgn="ctr"/>
+                      <a:r>
+                        <a:rPr lang="en-GB" sz="2300" u="none" strike="noStrike" dirty="0">
                           <a:effectLst/>
                         </a:rPr>
                         <a:t>'use' </a:t>
                       </a:r>
-                      <a:endParaRPr lang="en-GB" sz="1600" b="0" i="0" u="none" strike="noStrike" dirty="0">
+                      <a:endParaRPr lang="en-GB" sz="2300" b="0" i="0" u="none" strike="noStrike" dirty="0">
                         <a:solidFill>
                           <a:srgbClr val="000000"/>
                         </a:solidFill>
@@ -3690,21 +3778,21 @@
                       </a:endParaRPr>
                     </a:p>
                   </a:txBody>
-                  <a:tcPr marL="6350" marR="6350" marT="6350" marB="0" anchor="ctr"/>
+                  <a:tcPr marL="7373" marR="7373" marT="7373" marB="0" anchor="ctr"/>
                 </a:tc>
                 <a:tc>
                   <a:txBody>
                     <a:bodyPr/>
                     <a:lstStyle/>
                     <a:p>
-                      <a:pPr algn="l" rtl="0" fontAlgn="ctr"/>
-                      <a:r>
-                        <a:rPr lang="en-GB" sz="1600" u="none" strike="noStrike" dirty="0">
+                      <a:pPr algn="ctr" rtl="0" fontAlgn="ctr"/>
+                      <a:r>
+                        <a:rPr lang="en-GB" sz="2300" u="none" strike="noStrike" dirty="0">
                           <a:effectLst/>
                         </a:rPr>
                         <a:t>'case' </a:t>
                       </a:r>
-                      <a:endParaRPr lang="en-GB" sz="1600" b="0" i="0" u="none" strike="noStrike" dirty="0">
+                      <a:endParaRPr lang="en-GB" sz="2300" b="0" i="0" u="none" strike="noStrike" dirty="0">
                         <a:solidFill>
                           <a:srgbClr val="000000"/>
                         </a:solidFill>
@@ -3713,33 +3801,21 @@
                       </a:endParaRPr>
                     </a:p>
                   </a:txBody>
-                  <a:tcPr marL="6350" marR="6350" marT="6350" marB="0" anchor="ctr"/>
+                  <a:tcPr marL="7373" marR="7373" marT="7373" marB="0" anchor="ctr"/>
                 </a:tc>
                 <a:tc>
                   <a:txBody>
                     <a:bodyPr/>
                     <a:lstStyle/>
                     <a:p>
-                      <a:pPr algn="l" rtl="0" fontAlgn="ctr"/>
-                      <a:r>
-                        <a:rPr lang="en-GB" sz="1600" u="none" strike="noStrike" dirty="0">
-                          <a:effectLst/>
-                        </a:rPr>
-                        <a:t>'</a:t>
-                      </a:r>
-                      <a:r>
-                        <a:rPr lang="en-GB" sz="1600" u="none" strike="noStrike" dirty="0" err="1">
-                          <a:effectLst/>
-                        </a:rPr>
-                        <a:t>associ</a:t>
-                      </a:r>
-                      <a:r>
-                        <a:rPr lang="en-GB" sz="1600" u="none" strike="noStrike" dirty="0">
-                          <a:effectLst/>
-                        </a:rPr>
-                        <a:t>' </a:t>
-                      </a:r>
-                      <a:endParaRPr lang="en-GB" sz="1600" b="0" i="0" u="none" strike="noStrike" dirty="0">
+                      <a:pPr algn="ctr" rtl="0" fontAlgn="ctr"/>
+                      <a:r>
+                        <a:rPr lang="en-GB" sz="2300" u="none" strike="noStrike" dirty="0">
+                          <a:effectLst/>
+                        </a:rPr>
+                        <a:t>'result' </a:t>
+                      </a:r>
+                      <a:endParaRPr lang="en-GB" sz="2300" b="0" i="0" u="none" strike="noStrike" dirty="0">
                         <a:solidFill>
                           <a:srgbClr val="000000"/>
                         </a:solidFill>
@@ -3748,33 +3824,33 @@
                       </a:endParaRPr>
                     </a:p>
                   </a:txBody>
-                  <a:tcPr marL="6350" marR="6350" marT="6350" marB="0" anchor="ctr"/>
+                  <a:tcPr marL="7373" marR="7373" marT="7373" marB="0" anchor="ctr"/>
                 </a:tc>
                 <a:tc>
                   <a:txBody>
                     <a:bodyPr/>
                     <a:lstStyle/>
                     <a:p>
-                      <a:pPr algn="l" rtl="0" fontAlgn="ctr"/>
-                      <a:r>
-                        <a:rPr lang="en-GB" sz="1600" u="none" strike="noStrike" dirty="0">
+                      <a:pPr algn="ctr" rtl="0" fontAlgn="ctr"/>
+                      <a:r>
+                        <a:rPr lang="en-GB" sz="2300" u="none" strike="noStrike" dirty="0">
                           <a:effectLst/>
                         </a:rPr>
                         <a:t>'</a:t>
                       </a:r>
                       <a:r>
-                        <a:rPr lang="en-GB" sz="1600" u="none" strike="noStrike" dirty="0" err="1">
+                        <a:rPr lang="en-GB" sz="2300" u="none" strike="noStrike" dirty="0" err="1">
                           <a:effectLst/>
                         </a:rPr>
                         <a:t>analysi</a:t>
                       </a:r>
                       <a:r>
-                        <a:rPr lang="en-GB" sz="1600" u="none" strike="noStrike" dirty="0">
+                        <a:rPr lang="en-GB" sz="2300" u="none" strike="noStrike" dirty="0">
                           <a:effectLst/>
                         </a:rPr>
                         <a:t>' </a:t>
                       </a:r>
-                      <a:endParaRPr lang="en-GB" sz="1600" b="0" i="0" u="none" strike="noStrike" dirty="0">
+                      <a:endParaRPr lang="en-GB" sz="2300" b="0" i="0" u="none" strike="noStrike" dirty="0">
                         <a:solidFill>
                           <a:srgbClr val="000000"/>
                         </a:solidFill>
@@ -3783,33 +3859,33 @@
                       </a:endParaRPr>
                     </a:p>
                   </a:txBody>
-                  <a:tcPr marL="6350" marR="6350" marT="6350" marB="0" anchor="ctr"/>
+                  <a:tcPr marL="7373" marR="7373" marT="7373" marB="0" anchor="ctr"/>
                 </a:tc>
                 <a:tc>
                   <a:txBody>
                     <a:bodyPr/>
                     <a:lstStyle/>
                     <a:p>
-                      <a:pPr algn="l" rtl="0" fontAlgn="ctr"/>
-                      <a:r>
-                        <a:rPr lang="en-GB" sz="1600" u="none" strike="noStrike" dirty="0">
+                      <a:pPr algn="ctr" rtl="0" fontAlgn="ctr"/>
+                      <a:r>
+                        <a:rPr lang="en-GB" sz="2300" u="none" strike="noStrike" dirty="0">
                           <a:effectLst/>
                         </a:rPr>
                         <a:t>'</a:t>
                       </a:r>
                       <a:r>
-                        <a:rPr lang="en-GB" sz="1600" u="none" strike="noStrike" dirty="0" err="1">
-                          <a:effectLst/>
-                        </a:rPr>
-                        <a:t>famili</a:t>
-                      </a:r>
-                      <a:r>
-                        <a:rPr lang="en-GB" sz="1600" u="none" strike="noStrike" dirty="0">
+                        <a:rPr lang="en-GB" sz="2300" u="none" strike="noStrike" dirty="0" err="1">
+                          <a:effectLst/>
+                        </a:rPr>
+                        <a:t>associ</a:t>
+                      </a:r>
+                      <a:r>
+                        <a:rPr lang="en-GB" sz="2300" u="none" strike="noStrike" dirty="0">
                           <a:effectLst/>
                         </a:rPr>
                         <a:t>' </a:t>
                       </a:r>
-                      <a:endParaRPr lang="en-GB" sz="1600" b="0" i="0" u="none" strike="noStrike" dirty="0">
+                      <a:endParaRPr lang="en-GB" sz="2300" b="0" i="0" u="none" strike="noStrike" dirty="0">
                         <a:solidFill>
                           <a:srgbClr val="000000"/>
                         </a:solidFill>
@@ -3818,21 +3894,49 @@
                       </a:endParaRPr>
                     </a:p>
                   </a:txBody>
-                  <a:tcPr marL="6350" marR="6350" marT="6350" marB="0" anchor="ctr"/>
+                  <a:tcPr marL="7373" marR="7373" marT="7373" marB="0" anchor="ctr"/>
+                </a:tc>
+                <a:extLst>
+                  <a:ext uri="{0D108BD9-81ED-4DB2-BD59-A6C34878D82A}">
+                    <a16:rowId xmlns:a16="http://schemas.microsoft.com/office/drawing/2014/main" val="1705348395"/>
+                  </a:ext>
+                </a:extLst>
+              </a:tr>
+              <a:tr h="862406">
+                <a:tc>
+                  <a:txBody>
+                    <a:bodyPr/>
+                    <a:lstStyle/>
+                    <a:p>
+                      <a:pPr algn="l" rtl="0" fontAlgn="ctr"/>
+                      <a:r>
+                        <a:rPr lang="en-GB" sz="2300" u="none" strike="noStrike" dirty="0">
+                          <a:effectLst/>
+                        </a:rPr>
+                        <a:t>Count</a:t>
+                      </a:r>
+                      <a:endParaRPr lang="en-GB" sz="2300" b="1" i="0" u="none" strike="noStrike" dirty="0">
+                        <a:solidFill>
+                          <a:srgbClr val="FFFFFF"/>
+                        </a:solidFill>
+                        <a:effectLst/>
+                        <a:latin typeface="Calibri" panose="020F0502020204030204" pitchFamily="34" charset="0"/>
+                      </a:endParaRPr>
+                    </a:p>
+                  </a:txBody>
+                  <a:tcPr marL="7373" marR="7373" marT="7373" marB="0" anchor="ctr"/>
                 </a:tc>
                 <a:tc>
                   <a:txBody>
                     <a:bodyPr/>
                     <a:lstStyle/>
                     <a:p>
-                      <a:pPr algn="l" rtl="0" fontAlgn="ctr"/>
-                      <a:r>
-                        <a:rPr lang="en-GB" sz="1600" u="none" strike="noStrike" dirty="0">
-                          <a:effectLst/>
-                        </a:rPr>
-                        <a:t>'result' </a:t>
-                      </a:r>
-                      <a:endParaRPr lang="en-GB" sz="1600" b="0" i="0" u="none" strike="noStrike" dirty="0">
+                      <a:pPr algn="ctr" rtl="0" fontAlgn="ctr"/>
+                      <a:r>
+                        <a:rPr lang="en-GB" sz="2300" dirty="0"/>
+                        <a:t>69245</a:t>
+                      </a:r>
+                      <a:endParaRPr lang="en-GB" sz="2300" b="0" i="0" u="none" strike="noStrike" dirty="0">
                         <a:solidFill>
                           <a:srgbClr val="000000"/>
                         </a:solidFill>
@@ -3841,33 +3945,21 @@
                       </a:endParaRPr>
                     </a:p>
                   </a:txBody>
-                  <a:tcPr marL="6350" marR="6350" marT="6350" marB="0" anchor="ctr"/>
+                  <a:tcPr marL="7373" marR="7373" marT="7373" marB="0" anchor="ctr"/>
                 </a:tc>
                 <a:tc>
                   <a:txBody>
                     <a:bodyPr/>
                     <a:lstStyle/>
                     <a:p>
-                      <a:pPr algn="l" rtl="0" fontAlgn="ctr"/>
-                      <a:r>
-                        <a:rPr lang="en-GB" sz="1600" u="none" strike="noStrike" dirty="0">
-                          <a:effectLst/>
-                        </a:rPr>
-                        <a:t>'</a:t>
-                      </a:r>
-                      <a:r>
-                        <a:rPr lang="en-GB" sz="1600" u="none" strike="noStrike" dirty="0" err="1">
-                          <a:effectLst/>
-                        </a:rPr>
-                        <a:t>chromosom</a:t>
-                      </a:r>
-                      <a:r>
-                        <a:rPr lang="en-GB" sz="1600" u="none" strike="noStrike" dirty="0">
-                          <a:effectLst/>
-                        </a:rPr>
-                        <a:t>'</a:t>
-                      </a:r>
-                      <a:endParaRPr lang="en-GB" sz="1600" b="0" i="0" u="none" strike="noStrike" dirty="0">
+                      <a:pPr algn="ctr" rtl="0" fontAlgn="ctr"/>
+                      <a:r>
+                        <a:rPr lang="en-GB" sz="2300" u="none" strike="noStrike" dirty="0">
+                          <a:effectLst/>
+                        </a:rPr>
+                        <a:t>60113</a:t>
+                      </a:r>
+                      <a:endParaRPr lang="en-GB" sz="2300" b="0" i="0" u="none" strike="noStrike" dirty="0">
                         <a:solidFill>
                           <a:srgbClr val="000000"/>
                         </a:solidFill>
@@ -3876,21 +3968,41 @@
                       </a:endParaRPr>
                     </a:p>
                   </a:txBody>
-                  <a:tcPr marL="6350" marR="6350" marT="6350" marB="0" anchor="ctr"/>
+                  <a:tcPr marL="7373" marR="7373" marT="7373" marB="0" anchor="ctr"/>
                 </a:tc>
                 <a:tc>
                   <a:txBody>
                     <a:bodyPr/>
                     <a:lstStyle/>
                     <a:p>
-                      <a:pPr algn="l" rtl="0" fontAlgn="ctr"/>
-                      <a:r>
-                        <a:rPr lang="en-GB" sz="1600" u="none" strike="noStrike" dirty="0">
-                          <a:effectLst/>
-                        </a:rPr>
-                        <a:t>'disease'</a:t>
-                      </a:r>
-                      <a:endParaRPr lang="en-GB" sz="1600" b="0" i="0" u="none" strike="noStrike" dirty="0">
+                      <a:pPr algn="ctr" rtl="0" fontAlgn="ctr"/>
+                      <a:r>
+                        <a:rPr lang="en-GB" sz="2300" b="0" i="0" u="none" strike="noStrike" dirty="0">
+                          <a:solidFill>
+                            <a:srgbClr val="000000"/>
+                          </a:solidFill>
+                          <a:effectLst/>
+                          <a:latin typeface="Calibri" panose="020F0502020204030204" pitchFamily="34" charset="0"/>
+                        </a:rPr>
+                        <a:t>57719</a:t>
+                      </a:r>
+                    </a:p>
+                  </a:txBody>
+                  <a:tcPr marL="7373" marR="7373" marT="7373" marB="0" anchor="ctr"/>
+                </a:tc>
+                <a:tc>
+                  <a:txBody>
+                    <a:bodyPr/>
+                    <a:lstStyle/>
+                    <a:p>
+                      <a:pPr algn="ctr" rtl="0" fontAlgn="ctr"/>
+                      <a:r>
+                        <a:rPr lang="en-GB" sz="2300" u="none" strike="noStrike" dirty="0">
+                          <a:effectLst/>
+                        </a:rPr>
+                        <a:t>42684</a:t>
+                      </a:r>
+                      <a:endParaRPr lang="en-GB" sz="2300" b="0" i="0" u="none" strike="noStrike" dirty="0">
                         <a:solidFill>
                           <a:srgbClr val="000000"/>
                         </a:solidFill>
@@ -3899,15 +4011,153 @@
                       </a:endParaRPr>
                     </a:p>
                   </a:txBody>
-                  <a:tcPr marL="6350" marR="6350" marT="6350" marB="0" anchor="ctr"/>
+                  <a:tcPr marL="7373" marR="7373" marT="7373" marB="0" anchor="ctr"/>
+                </a:tc>
+                <a:tc>
+                  <a:txBody>
+                    <a:bodyPr/>
+                    <a:lstStyle/>
+                    <a:p>
+                      <a:pPr algn="ctr" rtl="0" fontAlgn="ctr"/>
+                      <a:r>
+                        <a:rPr lang="en-GB" sz="2300" u="none" strike="noStrike" dirty="0">
+                          <a:effectLst/>
+                        </a:rPr>
+                        <a:t>32414</a:t>
+                      </a:r>
+                      <a:endParaRPr lang="en-GB" sz="2300" b="0" i="0" u="none" strike="noStrike" dirty="0">
+                        <a:solidFill>
+                          <a:srgbClr val="000000"/>
+                        </a:solidFill>
+                        <a:effectLst/>
+                        <a:latin typeface="Calibri" panose="020F0502020204030204" pitchFamily="34" charset="0"/>
+                      </a:endParaRPr>
+                    </a:p>
+                  </a:txBody>
+                  <a:tcPr marL="7373" marR="7373" marT="7373" marB="0" anchor="ctr"/>
+                </a:tc>
+                <a:tc>
+                  <a:txBody>
+                    <a:bodyPr/>
+                    <a:lstStyle/>
+                    <a:p>
+                      <a:pPr algn="ctr" rtl="0" fontAlgn="ctr"/>
+                      <a:r>
+                        <a:rPr lang="en-GB" sz="2300" u="none" strike="noStrike" dirty="0">
+                          <a:effectLst/>
+                        </a:rPr>
+                        <a:t>28317</a:t>
+                      </a:r>
+                      <a:endParaRPr lang="en-GB" sz="2300" b="0" i="0" u="none" strike="noStrike" dirty="0">
+                        <a:solidFill>
+                          <a:srgbClr val="000000"/>
+                        </a:solidFill>
+                        <a:effectLst/>
+                        <a:latin typeface="Calibri" panose="020F0502020204030204" pitchFamily="34" charset="0"/>
+                      </a:endParaRPr>
+                    </a:p>
+                  </a:txBody>
+                  <a:tcPr marL="7373" marR="7373" marT="7373" marB="0" anchor="ctr"/>
+                </a:tc>
+                <a:tc>
+                  <a:txBody>
+                    <a:bodyPr/>
+                    <a:lstStyle/>
+                    <a:p>
+                      <a:pPr algn="ctr" rtl="0" fontAlgn="ctr"/>
+                      <a:r>
+                        <a:rPr lang="en-GB" sz="2300" u="none" strike="noStrike" dirty="0">
+                          <a:effectLst/>
+                        </a:rPr>
+                        <a:t>27007</a:t>
+                      </a:r>
+                      <a:endParaRPr lang="en-GB" sz="2300" b="0" i="0" u="none" strike="noStrike" dirty="0">
+                        <a:solidFill>
+                          <a:srgbClr val="000000"/>
+                        </a:solidFill>
+                        <a:effectLst/>
+                        <a:latin typeface="Calibri" panose="020F0502020204030204" pitchFamily="34" charset="0"/>
+                      </a:endParaRPr>
+                    </a:p>
+                  </a:txBody>
+                  <a:tcPr marL="7373" marR="7373" marT="7373" marB="0" anchor="ctr"/>
+                </a:tc>
+                <a:tc>
+                  <a:txBody>
+                    <a:bodyPr/>
+                    <a:lstStyle/>
+                    <a:p>
+                      <a:pPr algn="ctr" rtl="0" fontAlgn="ctr"/>
+                      <a:r>
+                        <a:rPr lang="en-GB" sz="2300" u="none" strike="noStrike" dirty="0">
+                          <a:effectLst/>
+                        </a:rPr>
+                        <a:t>25783</a:t>
+                      </a:r>
+                      <a:endParaRPr lang="en-GB" sz="2300" b="0" i="0" u="none" strike="noStrike" dirty="0">
+                        <a:solidFill>
+                          <a:srgbClr val="000000"/>
+                        </a:solidFill>
+                        <a:effectLst/>
+                        <a:latin typeface="Calibri" panose="020F0502020204030204" pitchFamily="34" charset="0"/>
+                      </a:endParaRPr>
+                    </a:p>
+                  </a:txBody>
+                  <a:tcPr marL="7373" marR="7373" marT="7373" marB="0" anchor="ctr"/>
+                </a:tc>
+                <a:tc>
+                  <a:txBody>
+                    <a:bodyPr/>
+                    <a:lstStyle/>
+                    <a:p>
+                      <a:pPr algn="ctr" rtl="0" fontAlgn="ctr"/>
+                      <a:r>
+                        <a:rPr lang="en-GB" sz="2300" u="none" strike="noStrike" dirty="0">
+                          <a:effectLst/>
+                        </a:rPr>
+                        <a:t>24804</a:t>
+                      </a:r>
+                      <a:endParaRPr lang="en-GB" sz="2300" b="0" i="0" u="none" strike="noStrike" dirty="0">
+                        <a:solidFill>
+                          <a:srgbClr val="000000"/>
+                        </a:solidFill>
+                        <a:effectLst/>
+                        <a:latin typeface="Calibri" panose="020F0502020204030204" pitchFamily="34" charset="0"/>
+                      </a:endParaRPr>
+                    </a:p>
+                  </a:txBody>
+                  <a:tcPr marL="7373" marR="7373" marT="7373" marB="0" anchor="ctr"/>
+                </a:tc>
+                <a:tc>
+                  <a:txBody>
+                    <a:bodyPr/>
+                    <a:lstStyle/>
+                    <a:p>
+                      <a:pPr algn="ctr" rtl="0" fontAlgn="ctr"/>
+                      <a:r>
+                        <a:rPr lang="en-GB" sz="2300" u="none" strike="noStrike" dirty="0">
+                          <a:effectLst/>
+                        </a:rPr>
+                        <a:t>24741</a:t>
+                      </a:r>
+                      <a:endParaRPr lang="en-GB" sz="2300" b="0" i="0" u="none" strike="noStrike" dirty="0">
+                        <a:solidFill>
+                          <a:srgbClr val="000000"/>
+                        </a:solidFill>
+                        <a:effectLst/>
+                        <a:latin typeface="Calibri" panose="020F0502020204030204" pitchFamily="34" charset="0"/>
+                      </a:endParaRPr>
+                    </a:p>
+                  </a:txBody>
+                  <a:tcPr marL="7373" marR="7373" marT="7373" marB="0" anchor="ctr"/>
                 </a:tc>
                 <a:extLst>
                   <a:ext uri="{0D108BD9-81ED-4DB2-BD59-A6C34878D82A}">
-                    <a16:rowId xmlns:a16="http://schemas.microsoft.com/office/drawing/2014/main" val="1705348395"/>
+                    <a16:rowId xmlns:a16="http://schemas.microsoft.com/office/drawing/2014/main" val="811124556"/>
                   </a:ext>
                 </a:extLst>
               </a:tr>
-              <a:tr h="609600">
+              <a:tr h="1284627">
                 <a:tc>
                   <a:txBody>
                     <a:bodyPr/>
@@ -3915,12 +4165,308 @@
                     <a:p>
                       <a:pPr algn="l" rtl="0" fontAlgn="ctr"/>
                       <a:r>
-                        <a:rPr lang="en-GB" sz="1600" u="none" strike="noStrike" dirty="0">
+                        <a:rPr lang="en-GB" sz="2300" b="1" i="0" u="none" strike="noStrike" dirty="0">
+                          <a:solidFill>
+                            <a:srgbClr val="FFFFFF"/>
+                          </a:solidFill>
+                          <a:effectLst/>
+                          <a:latin typeface="Calibri" panose="020F0502020204030204" pitchFamily="34" charset="0"/>
+                        </a:rPr>
+                        <a:t>Matched abstracts</a:t>
+                      </a:r>
+                    </a:p>
+                  </a:txBody>
+                  <a:tcPr marL="7373" marR="7373" marT="7373" marB="0" anchor="ctr"/>
+                </a:tc>
+                <a:tc>
+                  <a:txBody>
+                    <a:bodyPr/>
+                    <a:lstStyle/>
+                    <a:p>
+                      <a:pPr algn="ctr" rtl="0" fontAlgn="ctr"/>
+                      <a:r>
+                        <a:rPr lang="en-GB" sz="2300" dirty="0"/>
+                        <a:t>'patient</a:t>
+                      </a:r>
+                    </a:p>
+                  </a:txBody>
+                  <a:tcPr marL="7373" marR="7373" marT="7373" marB="0" anchor="ctr"/>
+                </a:tc>
+                <a:tc>
+                  <a:txBody>
+                    <a:bodyPr/>
+                    <a:lstStyle/>
+                    <a:p>
+                      <a:pPr algn="ctr" rtl="0" fontAlgn="ctr"/>
+                      <a:r>
+                        <a:rPr lang="en-GB" sz="2300" u="none" strike="noStrike" dirty="0">
+                          <a:effectLst/>
+                        </a:rPr>
+                        <a:t>'gene'</a:t>
+                      </a:r>
+                      <a:endParaRPr lang="en-GB" sz="2300" b="0" i="0" u="none" strike="noStrike" dirty="0">
+                        <a:solidFill>
+                          <a:srgbClr val="000000"/>
+                        </a:solidFill>
+                        <a:effectLst/>
+                        <a:latin typeface="Calibri" panose="020F0502020204030204" pitchFamily="34" charset="0"/>
+                      </a:endParaRPr>
+                    </a:p>
+                  </a:txBody>
+                  <a:tcPr marL="7373" marR="7373" marT="7373" marB="0" anchor="ctr"/>
+                </a:tc>
+                <a:tc>
+                  <a:txBody>
+                    <a:bodyPr/>
+                    <a:lstStyle/>
+                    <a:p>
+                      <a:pPr algn="ctr" rtl="0" fontAlgn="ctr"/>
+                      <a:r>
+                        <a:rPr lang="en-GB" sz="2300" u="none" strike="noStrike" dirty="0">
+                          <a:effectLst/>
+                        </a:rPr>
+                        <a:t>'genet' </a:t>
+                      </a:r>
+                      <a:endParaRPr lang="en-GB" sz="2300" b="0" i="0" u="none" strike="noStrike" dirty="0">
+                        <a:solidFill>
+                          <a:srgbClr val="000000"/>
+                        </a:solidFill>
+                        <a:effectLst/>
+                        <a:latin typeface="Calibri" panose="020F0502020204030204" pitchFamily="34" charset="0"/>
+                      </a:endParaRPr>
+                    </a:p>
+                  </a:txBody>
+                  <a:tcPr marL="7373" marR="7373" marT="7373" marB="0" anchor="ctr"/>
+                </a:tc>
+                <a:tc>
+                  <a:txBody>
+                    <a:bodyPr/>
+                    <a:lstStyle/>
+                    <a:p>
+                      <a:pPr algn="ctr" rtl="0" fontAlgn="ctr"/>
+                      <a:r>
+                        <a:rPr lang="en-GB" sz="2300" u="none" strike="noStrike" dirty="0">
+                          <a:effectLst/>
+                        </a:rPr>
+                        <a:t>'</a:t>
+                      </a:r>
+                      <a:r>
+                        <a:rPr lang="en-GB" sz="2300" u="none" strike="noStrike" dirty="0" err="1">
+                          <a:effectLst/>
+                        </a:rPr>
+                        <a:t>disord</a:t>
+                      </a:r>
+                      <a:r>
+                        <a:rPr lang="en-GB" sz="2300" u="none" strike="noStrike" dirty="0">
+                          <a:effectLst/>
+                        </a:rPr>
+                        <a:t>' </a:t>
+                      </a:r>
+                      <a:endParaRPr lang="en-GB" sz="2300" b="0" i="0" u="none" strike="noStrike" dirty="0">
+                        <a:solidFill>
+                          <a:srgbClr val="000000"/>
+                        </a:solidFill>
+                        <a:effectLst/>
+                        <a:latin typeface="Calibri" panose="020F0502020204030204" pitchFamily="34" charset="0"/>
+                      </a:endParaRPr>
+                    </a:p>
+                  </a:txBody>
+                  <a:tcPr marL="7373" marR="7373" marT="7373" marB="0" anchor="ctr"/>
+                </a:tc>
+                <a:tc>
+                  <a:txBody>
+                    <a:bodyPr/>
+                    <a:lstStyle/>
+                    <a:p>
+                      <a:pPr algn="ctr" rtl="0" fontAlgn="ctr"/>
+                      <a:r>
+                        <a:rPr lang="en-GB" sz="2300" u="none" strike="noStrike" dirty="0">
+                          <a:effectLst/>
+                        </a:rPr>
+                        <a:t>'autism' </a:t>
+                      </a:r>
+                      <a:endParaRPr lang="en-GB" sz="2300" b="0" i="0" u="none" strike="noStrike" dirty="0">
+                        <a:solidFill>
+                          <a:srgbClr val="000000"/>
+                        </a:solidFill>
+                        <a:effectLst/>
+                        <a:latin typeface="Calibri" panose="020F0502020204030204" pitchFamily="34" charset="0"/>
+                      </a:endParaRPr>
+                    </a:p>
+                  </a:txBody>
+                  <a:tcPr marL="7373" marR="7373" marT="7373" marB="0" anchor="ctr"/>
+                </a:tc>
+                <a:tc>
+                  <a:txBody>
+                    <a:bodyPr/>
+                    <a:lstStyle/>
+                    <a:p>
+                      <a:pPr algn="ctr" rtl="0" fontAlgn="ctr"/>
+                      <a:r>
+                        <a:rPr lang="en-GB" sz="2300" u="none" strike="noStrike" dirty="0">
+                          <a:effectLst/>
+                        </a:rPr>
+                        <a:t>'</a:t>
+                      </a:r>
+                      <a:r>
+                        <a:rPr lang="en-GB" sz="2300" u="none" strike="noStrike" dirty="0" err="1">
+                          <a:effectLst/>
+                        </a:rPr>
+                        <a:t>syndrom</a:t>
+                      </a:r>
+                      <a:r>
+                        <a:rPr lang="en-GB" sz="2300" u="none" strike="noStrike" dirty="0">
+                          <a:effectLst/>
+                        </a:rPr>
+                        <a:t>' </a:t>
+                      </a:r>
+                      <a:endParaRPr lang="en-GB" sz="2300" b="0" i="0" u="none" strike="noStrike" dirty="0">
+                        <a:solidFill>
+                          <a:srgbClr val="000000"/>
+                        </a:solidFill>
+                        <a:effectLst/>
+                        <a:latin typeface="Calibri" panose="020F0502020204030204" pitchFamily="34" charset="0"/>
+                      </a:endParaRPr>
+                    </a:p>
+                  </a:txBody>
+                  <a:tcPr marL="7373" marR="7373" marT="7373" marB="0" anchor="ctr"/>
+                </a:tc>
+                <a:tc>
+                  <a:txBody>
+                    <a:bodyPr/>
+                    <a:lstStyle/>
+                    <a:p>
+                      <a:pPr algn="ctr" rtl="0" fontAlgn="ctr"/>
+                      <a:r>
+                        <a:rPr lang="en-GB" sz="2300" u="none" strike="noStrike" dirty="0">
+                          <a:effectLst/>
+                        </a:rPr>
+                        <a:t>'</a:t>
+                      </a:r>
+                      <a:r>
+                        <a:rPr lang="en-GB" sz="2300" u="none" strike="noStrike" dirty="0" err="1">
+                          <a:effectLst/>
+                        </a:rPr>
+                        <a:t>delet</a:t>
+                      </a:r>
+                      <a:r>
+                        <a:rPr lang="en-GB" sz="2300" u="none" strike="noStrike" dirty="0">
+                          <a:effectLst/>
+                        </a:rPr>
+                        <a:t>' </a:t>
+                      </a:r>
+                      <a:endParaRPr lang="en-GB" sz="2300" b="0" i="0" u="none" strike="noStrike" dirty="0">
+                        <a:solidFill>
+                          <a:srgbClr val="000000"/>
+                        </a:solidFill>
+                        <a:effectLst/>
+                        <a:latin typeface="Calibri" panose="020F0502020204030204" pitchFamily="34" charset="0"/>
+                      </a:endParaRPr>
+                    </a:p>
+                  </a:txBody>
+                  <a:tcPr marL="7373" marR="7373" marT="7373" marB="0" anchor="ctr"/>
+                </a:tc>
+                <a:tc>
+                  <a:txBody>
+                    <a:bodyPr/>
+                    <a:lstStyle/>
+                    <a:p>
+                      <a:pPr algn="ctr" rtl="0" fontAlgn="ctr"/>
+                      <a:r>
+                        <a:rPr lang="en-GB" sz="2300" u="none" strike="noStrike" dirty="0">
+                          <a:effectLst/>
+                        </a:rPr>
+                        <a:t>'</a:t>
+                      </a:r>
+                      <a:r>
+                        <a:rPr lang="en-GB" sz="2300" u="none" strike="noStrike" dirty="0" err="1">
+                          <a:effectLst/>
+                        </a:rPr>
+                        <a:t>mutat</a:t>
+                      </a:r>
+                      <a:r>
+                        <a:rPr lang="en-GB" sz="2300" u="none" strike="noStrike" dirty="0">
+                          <a:effectLst/>
+                        </a:rPr>
+                        <a:t>' </a:t>
+                      </a:r>
+                      <a:endParaRPr lang="en-GB" sz="2300" b="0" i="0" u="none" strike="noStrike" dirty="0">
+                        <a:solidFill>
+                          <a:srgbClr val="000000"/>
+                        </a:solidFill>
+                        <a:effectLst/>
+                        <a:latin typeface="Calibri" panose="020F0502020204030204" pitchFamily="34" charset="0"/>
+                      </a:endParaRPr>
+                    </a:p>
+                  </a:txBody>
+                  <a:tcPr marL="7373" marR="7373" marT="7373" marB="0" anchor="ctr"/>
+                </a:tc>
+                <a:tc>
+                  <a:txBody>
+                    <a:bodyPr/>
+                    <a:lstStyle/>
+                    <a:p>
+                      <a:pPr algn="ctr" rtl="0" fontAlgn="ctr"/>
+                      <a:r>
+                        <a:rPr lang="en-GB" sz="2300" u="none" strike="noStrike" dirty="0">
+                          <a:effectLst/>
+                        </a:rPr>
+                        <a:t>'case' </a:t>
+                      </a:r>
+                      <a:endParaRPr lang="en-GB" sz="2300" b="0" i="0" u="none" strike="noStrike" dirty="0">
+                        <a:solidFill>
+                          <a:srgbClr val="000000"/>
+                        </a:solidFill>
+                        <a:effectLst/>
+                        <a:latin typeface="Calibri" panose="020F0502020204030204" pitchFamily="34" charset="0"/>
+                      </a:endParaRPr>
+                    </a:p>
+                  </a:txBody>
+                  <a:tcPr marL="7373" marR="7373" marT="7373" marB="0" anchor="ctr"/>
+                </a:tc>
+                <a:tc>
+                  <a:txBody>
+                    <a:bodyPr/>
+                    <a:lstStyle/>
+                    <a:p>
+                      <a:pPr algn="ctr" rtl="0" fontAlgn="ctr"/>
+                      <a:r>
+                        <a:rPr lang="en-GB" sz="2300" u="none" strike="noStrike" dirty="0">
+                          <a:effectLst/>
+                        </a:rPr>
+                        <a:t>'clinic' </a:t>
+                      </a:r>
+                      <a:endParaRPr lang="en-GB" sz="2300" b="0" i="0" u="none" strike="noStrike" dirty="0">
+                        <a:solidFill>
+                          <a:srgbClr val="000000"/>
+                        </a:solidFill>
+                        <a:effectLst/>
+                        <a:latin typeface="Calibri" panose="020F0502020204030204" pitchFamily="34" charset="0"/>
+                      </a:endParaRPr>
+                    </a:p>
+                  </a:txBody>
+                  <a:tcPr marL="7373" marR="7373" marT="7373" marB="0" anchor="ctr"/>
+                </a:tc>
+                <a:extLst>
+                  <a:ext uri="{0D108BD9-81ED-4DB2-BD59-A6C34878D82A}">
+                    <a16:rowId xmlns:a16="http://schemas.microsoft.com/office/drawing/2014/main" val="2284964353"/>
+                  </a:ext>
+                </a:extLst>
+              </a:tr>
+              <a:tr h="862406">
+                <a:tc>
+                  <a:txBody>
+                    <a:bodyPr/>
+                    <a:lstStyle/>
+                    <a:p>
+                      <a:pPr algn="l" rtl="0" fontAlgn="ctr"/>
+                      <a:r>
+                        <a:rPr lang="en-GB" sz="2300" u="none" strike="noStrike" dirty="0">
                           <a:effectLst/>
                         </a:rPr>
                         <a:t>Count</a:t>
                       </a:r>
-                      <a:endParaRPr lang="en-GB" sz="1600" b="1" i="0" u="none" strike="noStrike" dirty="0">
+                      <a:endParaRPr lang="en-GB" sz="2300" b="1" i="0" u="none" strike="noStrike" dirty="0">
                         <a:solidFill>
                           <a:srgbClr val="FFFFFF"/>
                         </a:solidFill>
@@ -3929,7 +4475,7 @@
                       </a:endParaRPr>
                     </a:p>
                   </a:txBody>
-                  <a:tcPr marL="6350" marR="6350" marT="6350" marB="0" anchor="ctr"/>
+                  <a:tcPr marL="7373" marR="7373" marT="7373" marB="0" anchor="ctr"/>
                 </a:tc>
                 <a:tc>
                   <a:txBody>
@@ -3938,10 +4484,10 @@
                     <a:p>
                       <a:pPr algn="ctr" rtl="0" fontAlgn="ctr"/>
                       <a:r>
-                        <a:rPr lang="en-GB" sz="1600" dirty="0"/>
-                        <a:t>53560</a:t>
-                      </a:r>
-                      <a:endParaRPr lang="en-GB" sz="1600" b="0" i="0" u="none" strike="noStrike" dirty="0">
+                        <a:rPr lang="en-GB" sz="2300" dirty="0"/>
+                        <a:t>2081</a:t>
+                      </a:r>
+                      <a:endParaRPr lang="en-GB" sz="2300" b="0" i="0" u="none" strike="noStrike" dirty="0">
                         <a:solidFill>
                           <a:srgbClr val="000000"/>
                         </a:solidFill>
@@ -3950,21 +4496,119 @@
                       </a:endParaRPr>
                     </a:p>
                   </a:txBody>
-                  <a:tcPr marL="6350" marR="6350" marT="6350" marB="0" anchor="ctr"/>
+                  <a:tcPr marL="7373" marR="7373" marT="7373" marB="0" anchor="ctr"/>
                 </a:tc>
                 <a:tc>
                   <a:txBody>
                     <a:bodyPr/>
                     <a:lstStyle/>
                     <a:p>
-                      <a:pPr algn="l" rtl="0" fontAlgn="ctr"/>
-                      <a:r>
-                        <a:rPr lang="en-GB" sz="1600" u="none" strike="noStrike" dirty="0">
-                          <a:effectLst/>
-                        </a:rPr>
-                        <a:t>45394</a:t>
-                      </a:r>
-                      <a:endParaRPr lang="en-GB" sz="1600" b="0" i="0" u="none" strike="noStrike" dirty="0">
+                      <a:pPr algn="ctr" rtl="0" fontAlgn="ctr"/>
+                      <a:r>
+                        <a:rPr lang="en-GB" sz="2300" b="0" i="0" u="none" strike="noStrike" dirty="0">
+                          <a:solidFill>
+                            <a:srgbClr val="000000"/>
+                          </a:solidFill>
+                          <a:effectLst/>
+                          <a:latin typeface="Calibri" panose="020F0502020204030204" pitchFamily="34" charset="0"/>
+                        </a:rPr>
+                        <a:t>1921</a:t>
+                      </a:r>
+                    </a:p>
+                  </a:txBody>
+                  <a:tcPr marL="7373" marR="7373" marT="7373" marB="0" anchor="ctr"/>
+                </a:tc>
+                <a:tc>
+                  <a:txBody>
+                    <a:bodyPr/>
+                    <a:lstStyle/>
+                    <a:p>
+                      <a:pPr algn="ctr" rtl="0" fontAlgn="ctr"/>
+                      <a:r>
+                        <a:rPr lang="en-GB" sz="2300" b="0" i="0" u="none" strike="noStrike" dirty="0">
+                          <a:solidFill>
+                            <a:srgbClr val="000000"/>
+                          </a:solidFill>
+                          <a:effectLst/>
+                          <a:latin typeface="Calibri" panose="020F0502020204030204" pitchFamily="34" charset="0"/>
+                        </a:rPr>
+                        <a:t>1235</a:t>
+                      </a:r>
+                    </a:p>
+                  </a:txBody>
+                  <a:tcPr marL="7373" marR="7373" marT="7373" marB="0" anchor="ctr"/>
+                </a:tc>
+                <a:tc>
+                  <a:txBody>
+                    <a:bodyPr/>
+                    <a:lstStyle/>
+                    <a:p>
+                      <a:pPr algn="ctr" rtl="0" fontAlgn="ctr"/>
+                      <a:r>
+                        <a:rPr lang="en-GB" sz="2300" b="0" i="0" u="none" strike="noStrike" dirty="0">
+                          <a:solidFill>
+                            <a:srgbClr val="000000"/>
+                          </a:solidFill>
+                          <a:effectLst/>
+                          <a:latin typeface="Calibri" panose="020F0502020204030204" pitchFamily="34" charset="0"/>
+                        </a:rPr>
+                        <a:t>1088</a:t>
+                      </a:r>
+                    </a:p>
+                  </a:txBody>
+                  <a:tcPr marL="7373" marR="7373" marT="7373" marB="0" anchor="ctr"/>
+                </a:tc>
+                <a:tc>
+                  <a:txBody>
+                    <a:bodyPr/>
+                    <a:lstStyle/>
+                    <a:p>
+                      <a:pPr algn="ctr" rtl="0" fontAlgn="ctr"/>
+                      <a:r>
+                        <a:rPr lang="en-GB" sz="2300" b="0" i="0" u="none" strike="noStrike" dirty="0">
+                          <a:solidFill>
+                            <a:srgbClr val="000000"/>
+                          </a:solidFill>
+                          <a:effectLst/>
+                          <a:latin typeface="Calibri" panose="020F0502020204030204" pitchFamily="34" charset="0"/>
+                        </a:rPr>
+                        <a:t>1088</a:t>
+                      </a:r>
+                    </a:p>
+                  </a:txBody>
+                  <a:tcPr marL="7373" marR="7373" marT="7373" marB="0" anchor="ctr"/>
+                </a:tc>
+                <a:tc>
+                  <a:txBody>
+                    <a:bodyPr/>
+                    <a:lstStyle/>
+                    <a:p>
+                      <a:pPr algn="ctr" rtl="0" fontAlgn="ctr"/>
+                      <a:r>
+                        <a:rPr lang="en-GB" sz="2300" b="0" i="0" u="none" strike="noStrike" dirty="0">
+                          <a:solidFill>
+                            <a:srgbClr val="000000"/>
+                          </a:solidFill>
+                          <a:effectLst/>
+                          <a:latin typeface="Calibri" panose="020F0502020204030204" pitchFamily="34" charset="0"/>
+                        </a:rPr>
+                        <a:t>1087</a:t>
+                      </a:r>
+                    </a:p>
+                  </a:txBody>
+                  <a:tcPr marL="7373" marR="7373" marT="7373" marB="0" anchor="ctr"/>
+                </a:tc>
+                <a:tc>
+                  <a:txBody>
+                    <a:bodyPr/>
+                    <a:lstStyle/>
+                    <a:p>
+                      <a:pPr algn="ctr" rtl="0" fontAlgn="ctr"/>
+                      <a:r>
+                        <a:rPr lang="en-GB" sz="2300" dirty="0"/>
+                        <a:t>1068</a:t>
+                      </a:r>
+                      <a:endParaRPr lang="en-GB" sz="2300" b="0" i="0" u="none" strike="noStrike" dirty="0">
                         <a:solidFill>
                           <a:srgbClr val="000000"/>
                         </a:solidFill>
@@ -3973,706 +4617,7 @@
                       </a:endParaRPr>
                     </a:p>
                   </a:txBody>
-                  <a:tcPr marL="6350" marR="6350" marT="6350" marB="0" anchor="ctr"/>
-                </a:tc>
-                <a:tc>
-                  <a:txBody>
-                    <a:bodyPr/>
-                    <a:lstStyle/>
-                    <a:p>
-                      <a:pPr algn="l" rtl="0" fontAlgn="ctr"/>
-                      <a:r>
-                        <a:rPr lang="en-GB" sz="1600" u="none" strike="noStrike" dirty="0">
-                          <a:effectLst/>
-                        </a:rPr>
-                        <a:t>45133</a:t>
-                      </a:r>
-                      <a:endParaRPr lang="en-GB" sz="1600" b="0" i="0" u="none" strike="noStrike" dirty="0">
-                        <a:solidFill>
-                          <a:srgbClr val="000000"/>
-                        </a:solidFill>
-                        <a:effectLst/>
-                        <a:latin typeface="Calibri" panose="020F0502020204030204" pitchFamily="34" charset="0"/>
-                      </a:endParaRPr>
-                    </a:p>
-                  </a:txBody>
-                  <a:tcPr marL="6350" marR="6350" marT="6350" marB="0" anchor="ctr"/>
-                </a:tc>
-                <a:tc>
-                  <a:txBody>
-                    <a:bodyPr/>
-                    <a:lstStyle/>
-                    <a:p>
-                      <a:pPr algn="l" rtl="0" fontAlgn="ctr"/>
-                      <a:r>
-                        <a:rPr lang="en-GB" sz="1600" u="none" strike="noStrike" dirty="0">
-                          <a:effectLst/>
-                        </a:rPr>
-                        <a:t>27857</a:t>
-                      </a:r>
-                      <a:endParaRPr lang="en-GB" sz="1600" b="0" i="0" u="none" strike="noStrike" dirty="0">
-                        <a:solidFill>
-                          <a:srgbClr val="000000"/>
-                        </a:solidFill>
-                        <a:effectLst/>
-                        <a:latin typeface="Calibri" panose="020F0502020204030204" pitchFamily="34" charset="0"/>
-                      </a:endParaRPr>
-                    </a:p>
-                  </a:txBody>
-                  <a:tcPr marL="6350" marR="6350" marT="6350" marB="0" anchor="ctr"/>
-                </a:tc>
-                <a:tc>
-                  <a:txBody>
-                    <a:bodyPr/>
-                    <a:lstStyle/>
-                    <a:p>
-                      <a:pPr algn="l" rtl="0" fontAlgn="ctr"/>
-                      <a:r>
-                        <a:rPr lang="en-GB" sz="1600" u="none" strike="noStrike" dirty="0">
-                          <a:effectLst/>
-                        </a:rPr>
-                        <a:t>25693</a:t>
-                      </a:r>
-                      <a:endParaRPr lang="en-GB" sz="1600" b="0" i="0" u="none" strike="noStrike" dirty="0">
-                        <a:solidFill>
-                          <a:srgbClr val="000000"/>
-                        </a:solidFill>
-                        <a:effectLst/>
-                        <a:latin typeface="Calibri" panose="020F0502020204030204" pitchFamily="34" charset="0"/>
-                      </a:endParaRPr>
-                    </a:p>
-                  </a:txBody>
-                  <a:tcPr marL="6350" marR="6350" marT="6350" marB="0" anchor="ctr"/>
-                </a:tc>
-                <a:tc>
-                  <a:txBody>
-                    <a:bodyPr/>
-                    <a:lstStyle/>
-                    <a:p>
-                      <a:pPr algn="l" rtl="0" fontAlgn="ctr"/>
-                      <a:r>
-                        <a:rPr lang="en-GB" sz="1600" u="none" strike="noStrike" dirty="0">
-                          <a:effectLst/>
-                        </a:rPr>
-                        <a:t>21618</a:t>
-                      </a:r>
-                      <a:endParaRPr lang="en-GB" sz="1600" b="0" i="0" u="none" strike="noStrike" dirty="0">
-                        <a:solidFill>
-                          <a:srgbClr val="000000"/>
-                        </a:solidFill>
-                        <a:effectLst/>
-                        <a:latin typeface="Calibri" panose="020F0502020204030204" pitchFamily="34" charset="0"/>
-                      </a:endParaRPr>
-                    </a:p>
-                  </a:txBody>
-                  <a:tcPr marL="6350" marR="6350" marT="6350" marB="0" anchor="ctr"/>
-                </a:tc>
-                <a:tc>
-                  <a:txBody>
-                    <a:bodyPr/>
-                    <a:lstStyle/>
-                    <a:p>
-                      <a:pPr algn="l" rtl="0" fontAlgn="ctr"/>
-                      <a:r>
-                        <a:rPr lang="en-GB" sz="1600" u="none" strike="noStrike" dirty="0">
-                          <a:effectLst/>
-                        </a:rPr>
-                        <a:t>20482</a:t>
-                      </a:r>
-                      <a:endParaRPr lang="en-GB" sz="1600" b="0" i="0" u="none" strike="noStrike" dirty="0">
-                        <a:solidFill>
-                          <a:srgbClr val="000000"/>
-                        </a:solidFill>
-                        <a:effectLst/>
-                        <a:latin typeface="Calibri" panose="020F0502020204030204" pitchFamily="34" charset="0"/>
-                      </a:endParaRPr>
-                    </a:p>
-                  </a:txBody>
-                  <a:tcPr marL="6350" marR="6350" marT="6350" marB="0" anchor="ctr"/>
-                </a:tc>
-                <a:tc>
-                  <a:txBody>
-                    <a:bodyPr/>
-                    <a:lstStyle/>
-                    <a:p>
-                      <a:pPr algn="l" rtl="0" fontAlgn="ctr"/>
-                      <a:r>
-                        <a:rPr lang="en-GB" sz="1600" u="none" strike="noStrike" dirty="0">
-                          <a:effectLst/>
-                        </a:rPr>
-                        <a:t>19130</a:t>
-                      </a:r>
-                      <a:endParaRPr lang="en-GB" sz="1600" b="0" i="0" u="none" strike="noStrike" dirty="0">
-                        <a:solidFill>
-                          <a:srgbClr val="000000"/>
-                        </a:solidFill>
-                        <a:effectLst/>
-                        <a:latin typeface="Calibri" panose="020F0502020204030204" pitchFamily="34" charset="0"/>
-                      </a:endParaRPr>
-                    </a:p>
-                  </a:txBody>
-                  <a:tcPr marL="6350" marR="6350" marT="6350" marB="0" anchor="ctr"/>
-                </a:tc>
-                <a:tc>
-                  <a:txBody>
-                    <a:bodyPr/>
-                    <a:lstStyle/>
-                    <a:p>
-                      <a:pPr algn="l" rtl="0" fontAlgn="ctr"/>
-                      <a:r>
-                        <a:rPr lang="en-GB" sz="1600" u="none" strike="noStrike" dirty="0">
-                          <a:effectLst/>
-                        </a:rPr>
-                        <a:t>19021</a:t>
-                      </a:r>
-                      <a:endParaRPr lang="en-GB" sz="1600" b="0" i="0" u="none" strike="noStrike" dirty="0">
-                        <a:solidFill>
-                          <a:srgbClr val="000000"/>
-                        </a:solidFill>
-                        <a:effectLst/>
-                        <a:latin typeface="Calibri" panose="020F0502020204030204" pitchFamily="34" charset="0"/>
-                      </a:endParaRPr>
-                    </a:p>
-                  </a:txBody>
-                  <a:tcPr marL="6350" marR="6350" marT="6350" marB="0" anchor="ctr"/>
-                </a:tc>
-                <a:tc>
-                  <a:txBody>
-                    <a:bodyPr/>
-                    <a:lstStyle/>
-                    <a:p>
-                      <a:pPr algn="l" rtl="0" fontAlgn="ctr"/>
-                      <a:r>
-                        <a:rPr lang="en-GB" sz="1600" u="none" strike="noStrike" dirty="0">
-                          <a:effectLst/>
-                        </a:rPr>
-                        <a:t>18871</a:t>
-                      </a:r>
-                      <a:endParaRPr lang="en-GB" sz="1600" b="0" i="0" u="none" strike="noStrike" dirty="0">
-                        <a:solidFill>
-                          <a:srgbClr val="000000"/>
-                        </a:solidFill>
-                        <a:effectLst/>
-                        <a:latin typeface="Calibri" panose="020F0502020204030204" pitchFamily="34" charset="0"/>
-                      </a:endParaRPr>
-                    </a:p>
-                  </a:txBody>
-                  <a:tcPr marL="6350" marR="6350" marT="6350" marB="0" anchor="ctr"/>
-                </a:tc>
-                <a:tc>
-                  <a:txBody>
-                    <a:bodyPr/>
-                    <a:lstStyle/>
-                    <a:p>
-                      <a:pPr algn="l" rtl="0" fontAlgn="ctr"/>
-                      <a:r>
-                        <a:rPr lang="en-GB" sz="1600" u="none" strike="noStrike" dirty="0">
-                          <a:effectLst/>
-                        </a:rPr>
-                        <a:t>18457</a:t>
-                      </a:r>
-                      <a:endParaRPr lang="en-GB" sz="1600" b="0" i="0" u="none" strike="noStrike" dirty="0">
-                        <a:solidFill>
-                          <a:srgbClr val="000000"/>
-                        </a:solidFill>
-                        <a:effectLst/>
-                        <a:latin typeface="Calibri" panose="020F0502020204030204" pitchFamily="34" charset="0"/>
-                      </a:endParaRPr>
-                    </a:p>
-                  </a:txBody>
-                  <a:tcPr marL="6350" marR="6350" marT="6350" marB="0" anchor="ctr"/>
-                </a:tc>
-                <a:tc>
-                  <a:txBody>
-                    <a:bodyPr/>
-                    <a:lstStyle/>
-                    <a:p>
-                      <a:pPr algn="l" rtl="0" fontAlgn="ctr"/>
-                      <a:r>
-                        <a:rPr lang="en-GB" sz="1600" u="none" strike="noStrike" dirty="0">
-                          <a:effectLst/>
-                        </a:rPr>
-                        <a:t>18408</a:t>
-                      </a:r>
-                      <a:endParaRPr lang="en-GB" sz="1600" b="0" i="0" u="none" strike="noStrike" dirty="0">
-                        <a:solidFill>
-                          <a:srgbClr val="000000"/>
-                        </a:solidFill>
-                        <a:effectLst/>
-                        <a:latin typeface="Calibri" panose="020F0502020204030204" pitchFamily="34" charset="0"/>
-                      </a:endParaRPr>
-                    </a:p>
-                  </a:txBody>
-                  <a:tcPr marL="6350" marR="6350" marT="6350" marB="0" anchor="ctr"/>
-                </a:tc>
-                <a:tc>
-                  <a:txBody>
-                    <a:bodyPr/>
-                    <a:lstStyle/>
-                    <a:p>
-                      <a:pPr algn="l" rtl="0" fontAlgn="ctr"/>
-                      <a:r>
-                        <a:rPr lang="en-GB" sz="1600" u="none" strike="noStrike" dirty="0">
-                          <a:effectLst/>
-                        </a:rPr>
-                        <a:t>17660</a:t>
-                      </a:r>
-                      <a:endParaRPr lang="en-GB" sz="1600" b="0" i="0" u="none" strike="noStrike" dirty="0">
-                        <a:solidFill>
-                          <a:srgbClr val="000000"/>
-                        </a:solidFill>
-                        <a:effectLst/>
-                        <a:latin typeface="Calibri" panose="020F0502020204030204" pitchFamily="34" charset="0"/>
-                      </a:endParaRPr>
-                    </a:p>
-                  </a:txBody>
-                  <a:tcPr marL="6350" marR="6350" marT="6350" marB="0" anchor="ctr"/>
-                </a:tc>
-                <a:extLst>
-                  <a:ext uri="{0D108BD9-81ED-4DB2-BD59-A6C34878D82A}">
-                    <a16:rowId xmlns:a16="http://schemas.microsoft.com/office/drawing/2014/main" val="811124556"/>
-                  </a:ext>
-                </a:extLst>
-              </a:tr>
-              <a:tr h="908050">
-                <a:tc>
-                  <a:txBody>
-                    <a:bodyPr/>
-                    <a:lstStyle/>
-                    <a:p>
-                      <a:pPr algn="l" rtl="0" fontAlgn="ctr"/>
-                      <a:r>
-                        <a:rPr lang="en-GB" sz="1600" u="none" strike="noStrike" dirty="0">
-                          <a:effectLst/>
-                        </a:rPr>
-                        <a:t>Keywords</a:t>
-                      </a:r>
-                      <a:endParaRPr lang="en-GB" sz="1600" b="1" i="0" u="none" strike="noStrike" dirty="0">
-                        <a:solidFill>
-                          <a:srgbClr val="FFFFFF"/>
-                        </a:solidFill>
-                        <a:effectLst/>
-                        <a:latin typeface="Calibri" panose="020F0502020204030204" pitchFamily="34" charset="0"/>
-                      </a:endParaRPr>
-                    </a:p>
-                  </a:txBody>
-                  <a:tcPr marL="6350" marR="6350" marT="6350" marB="0" anchor="ctr"/>
-                </a:tc>
-                <a:tc>
-                  <a:txBody>
-                    <a:bodyPr/>
-                    <a:lstStyle/>
-                    <a:p>
-                      <a:pPr algn="l" rtl="0" fontAlgn="ctr"/>
-                      <a:r>
-                        <a:rPr lang="en-GB" sz="1600" dirty="0"/>
-                        <a:t>'patient</a:t>
-                      </a:r>
-                    </a:p>
-                  </a:txBody>
-                  <a:tcPr marL="6350" marR="6350" marT="6350" marB="0" anchor="ctr"/>
-                </a:tc>
-                <a:tc>
-                  <a:txBody>
-                    <a:bodyPr/>
-                    <a:lstStyle/>
-                    <a:p>
-                      <a:pPr algn="l" rtl="0" fontAlgn="ctr"/>
-                      <a:r>
-                        <a:rPr lang="en-GB" sz="1600" u="none" strike="noStrike" dirty="0">
-                          <a:effectLst/>
-                        </a:rPr>
-                        <a:t>'</a:t>
-                      </a:r>
-                      <a:r>
-                        <a:rPr lang="en-GB" sz="1600" u="none" strike="noStrike" dirty="0" err="1">
-                          <a:effectLst/>
-                        </a:rPr>
-                        <a:t>delet</a:t>
-                      </a:r>
-                      <a:r>
-                        <a:rPr lang="en-GB" sz="1600" u="none" strike="noStrike" dirty="0">
-                          <a:effectLst/>
-                        </a:rPr>
-                        <a:t>'</a:t>
-                      </a:r>
-                      <a:endParaRPr lang="en-GB" sz="1600" b="0" i="0" u="none" strike="noStrike" dirty="0">
-                        <a:solidFill>
-                          <a:srgbClr val="000000"/>
-                        </a:solidFill>
-                        <a:effectLst/>
-                        <a:latin typeface="Calibri" panose="020F0502020204030204" pitchFamily="34" charset="0"/>
-                      </a:endParaRPr>
-                    </a:p>
-                  </a:txBody>
-                  <a:tcPr marL="6350" marR="6350" marT="6350" marB="0" anchor="ctr"/>
-                </a:tc>
-                <a:tc>
-                  <a:txBody>
-                    <a:bodyPr/>
-                    <a:lstStyle/>
-                    <a:p>
-                      <a:pPr algn="l" rtl="0" fontAlgn="ctr"/>
-                      <a:r>
-                        <a:rPr lang="en-GB" sz="1600" u="none" strike="noStrike" dirty="0">
-                          <a:effectLst/>
-                        </a:rPr>
-                        <a:t>'autism' </a:t>
-                      </a:r>
-                      <a:endParaRPr lang="en-GB" sz="1600" b="0" i="0" u="none" strike="noStrike" dirty="0">
-                        <a:solidFill>
-                          <a:srgbClr val="000000"/>
-                        </a:solidFill>
-                        <a:effectLst/>
-                        <a:latin typeface="Calibri" panose="020F0502020204030204" pitchFamily="34" charset="0"/>
-                      </a:endParaRPr>
-                    </a:p>
-                  </a:txBody>
-                  <a:tcPr marL="6350" marR="6350" marT="6350" marB="0" anchor="ctr"/>
-                </a:tc>
-                <a:tc>
-                  <a:txBody>
-                    <a:bodyPr/>
-                    <a:lstStyle/>
-                    <a:p>
-                      <a:pPr algn="l" rtl="0" fontAlgn="ctr"/>
-                      <a:r>
-                        <a:rPr lang="en-GB" sz="1600" u="none" strike="noStrike" dirty="0">
-                          <a:effectLst/>
-                        </a:rPr>
-                        <a:t>'</a:t>
-                      </a:r>
-                      <a:r>
-                        <a:rPr lang="en-GB" sz="1600" u="none" strike="noStrike" dirty="0" err="1">
-                          <a:effectLst/>
-                        </a:rPr>
-                        <a:t>syndrom</a:t>
-                      </a:r>
-                      <a:r>
-                        <a:rPr lang="en-GB" sz="1600" u="none" strike="noStrike" dirty="0">
-                          <a:effectLst/>
-                        </a:rPr>
-                        <a:t>' </a:t>
-                      </a:r>
-                      <a:endParaRPr lang="en-GB" sz="1600" b="0" i="0" u="none" strike="noStrike" dirty="0">
-                        <a:solidFill>
-                          <a:srgbClr val="000000"/>
-                        </a:solidFill>
-                        <a:effectLst/>
-                        <a:latin typeface="Calibri" panose="020F0502020204030204" pitchFamily="34" charset="0"/>
-                      </a:endParaRPr>
-                    </a:p>
-                  </a:txBody>
-                  <a:tcPr marL="6350" marR="6350" marT="6350" marB="0" anchor="ctr"/>
-                </a:tc>
-                <a:tc>
-                  <a:txBody>
-                    <a:bodyPr/>
-                    <a:lstStyle/>
-                    <a:p>
-                      <a:pPr algn="l" rtl="0" fontAlgn="ctr"/>
-                      <a:r>
-                        <a:rPr lang="en-GB" sz="1600" u="none" strike="noStrike" dirty="0">
-                          <a:effectLst/>
-                        </a:rPr>
-                        <a:t>'</a:t>
-                      </a:r>
-                      <a:r>
-                        <a:rPr lang="en-GB" sz="1600" u="none" strike="noStrike" dirty="0" err="1">
-                          <a:effectLst/>
-                        </a:rPr>
-                        <a:t>mutat</a:t>
-                      </a:r>
-                      <a:r>
-                        <a:rPr lang="en-GB" sz="1600" u="none" strike="noStrike" dirty="0">
-                          <a:effectLst/>
-                        </a:rPr>
-                        <a:t>' </a:t>
-                      </a:r>
-                      <a:endParaRPr lang="en-GB" sz="1600" b="0" i="0" u="none" strike="noStrike" dirty="0">
-                        <a:solidFill>
-                          <a:srgbClr val="000000"/>
-                        </a:solidFill>
-                        <a:effectLst/>
-                        <a:latin typeface="Calibri" panose="020F0502020204030204" pitchFamily="34" charset="0"/>
-                      </a:endParaRPr>
-                    </a:p>
-                  </a:txBody>
-                  <a:tcPr marL="6350" marR="6350" marT="6350" marB="0" anchor="ctr"/>
-                </a:tc>
-                <a:tc>
-                  <a:txBody>
-                    <a:bodyPr/>
-                    <a:lstStyle/>
-                    <a:p>
-                      <a:pPr algn="l" rtl="0" fontAlgn="ctr"/>
-                      <a:r>
-                        <a:rPr lang="en-GB" sz="1600" u="none" strike="noStrike" dirty="0">
-                          <a:effectLst/>
-                        </a:rPr>
-                        <a:t>'</a:t>
-                      </a:r>
-                      <a:r>
-                        <a:rPr lang="en-GB" sz="1600" u="none" strike="noStrike" dirty="0" err="1">
-                          <a:effectLst/>
-                        </a:rPr>
-                        <a:t>disord</a:t>
-                      </a:r>
-                      <a:r>
-                        <a:rPr lang="en-GB" sz="1600" u="none" strike="noStrike" dirty="0">
-                          <a:effectLst/>
-                        </a:rPr>
-                        <a:t>' </a:t>
-                      </a:r>
-                      <a:endParaRPr lang="en-GB" sz="1600" b="0" i="0" u="none" strike="noStrike" dirty="0">
-                        <a:solidFill>
-                          <a:srgbClr val="000000"/>
-                        </a:solidFill>
-                        <a:effectLst/>
-                        <a:latin typeface="Calibri" panose="020F0502020204030204" pitchFamily="34" charset="0"/>
-                      </a:endParaRPr>
-                    </a:p>
-                  </a:txBody>
-                  <a:tcPr marL="6350" marR="6350" marT="6350" marB="0" anchor="ctr"/>
-                </a:tc>
-                <a:tc>
-                  <a:txBody>
-                    <a:bodyPr/>
-                    <a:lstStyle/>
-                    <a:p>
-                      <a:pPr algn="l" rtl="0" fontAlgn="ctr"/>
-                      <a:r>
-                        <a:rPr lang="en-GB" sz="1600" u="none" strike="noStrike" dirty="0">
-                          <a:effectLst/>
-                        </a:rPr>
-                        <a:t>'none' </a:t>
-                      </a:r>
-                      <a:endParaRPr lang="en-GB" sz="1600" b="0" i="0" u="none" strike="noStrike" dirty="0">
-                        <a:solidFill>
-                          <a:srgbClr val="000000"/>
-                        </a:solidFill>
-                        <a:effectLst/>
-                        <a:latin typeface="Calibri" panose="020F0502020204030204" pitchFamily="34" charset="0"/>
-                      </a:endParaRPr>
-                    </a:p>
-                  </a:txBody>
-                  <a:tcPr marL="6350" marR="6350" marT="6350" marB="0" anchor="ctr"/>
-                </a:tc>
-                <a:tc>
-                  <a:txBody>
-                    <a:bodyPr/>
-                    <a:lstStyle/>
-                    <a:p>
-                      <a:pPr algn="l" rtl="0" fontAlgn="ctr"/>
-                      <a:r>
-                        <a:rPr lang="en-GB" sz="1600" u="none" strike="noStrike" dirty="0">
-                          <a:effectLst/>
-                        </a:rPr>
-                        <a:t>'</a:t>
-                      </a:r>
-                      <a:r>
-                        <a:rPr lang="en-GB" sz="1600" u="none" strike="noStrike" dirty="0" err="1">
-                          <a:effectLst/>
-                        </a:rPr>
-                        <a:t>chromosom</a:t>
-                      </a:r>
-                      <a:r>
-                        <a:rPr lang="en-GB" sz="1600" u="none" strike="noStrike" dirty="0">
-                          <a:effectLst/>
-                        </a:rPr>
-                        <a:t>' </a:t>
-                      </a:r>
-                      <a:endParaRPr lang="en-GB" sz="1600" b="0" i="0" u="none" strike="noStrike" dirty="0">
-                        <a:solidFill>
-                          <a:srgbClr val="000000"/>
-                        </a:solidFill>
-                        <a:effectLst/>
-                        <a:latin typeface="Calibri" panose="020F0502020204030204" pitchFamily="34" charset="0"/>
-                      </a:endParaRPr>
-                    </a:p>
-                  </a:txBody>
-                  <a:tcPr marL="6350" marR="6350" marT="6350" marB="0" anchor="ctr"/>
-                </a:tc>
-                <a:tc>
-                  <a:txBody>
-                    <a:bodyPr/>
-                    <a:lstStyle/>
-                    <a:p>
-                      <a:pPr algn="l" rtl="0" fontAlgn="ctr"/>
-                      <a:r>
-                        <a:rPr lang="en-GB" sz="1600" u="none" strike="noStrike" dirty="0">
-                          <a:effectLst/>
-                        </a:rPr>
-                        <a:t>'case' </a:t>
-                      </a:r>
-                      <a:endParaRPr lang="en-GB" sz="1600" b="0" i="0" u="none" strike="noStrike" dirty="0">
-                        <a:solidFill>
-                          <a:srgbClr val="000000"/>
-                        </a:solidFill>
-                        <a:effectLst/>
-                        <a:latin typeface="Calibri" panose="020F0502020204030204" pitchFamily="34" charset="0"/>
-                      </a:endParaRPr>
-                    </a:p>
-                  </a:txBody>
-                  <a:tcPr marL="6350" marR="6350" marT="6350" marB="0" anchor="ctr"/>
-                </a:tc>
-                <a:tc>
-                  <a:txBody>
-                    <a:bodyPr/>
-                    <a:lstStyle/>
-                    <a:p>
-                      <a:pPr algn="l" rtl="0" fontAlgn="ctr"/>
-                      <a:r>
-                        <a:rPr lang="en-GB" sz="1600" u="none" strike="noStrike" dirty="0">
-                          <a:effectLst/>
-                        </a:rPr>
-                        <a:t>'</a:t>
-                      </a:r>
-                      <a:r>
-                        <a:rPr lang="en-GB" sz="1600" u="none" strike="noStrike" dirty="0" err="1">
-                          <a:effectLst/>
-                        </a:rPr>
-                        <a:t>studi</a:t>
-                      </a:r>
-                      <a:r>
-                        <a:rPr lang="en-GB" sz="1600" u="none" strike="noStrike" dirty="0">
-                          <a:effectLst/>
-                        </a:rPr>
-                        <a:t>' </a:t>
-                      </a:r>
-                      <a:endParaRPr lang="en-GB" sz="1600" b="0" i="0" u="none" strike="noStrike" dirty="0">
-                        <a:solidFill>
-                          <a:srgbClr val="000000"/>
-                        </a:solidFill>
-                        <a:effectLst/>
-                        <a:latin typeface="Calibri" panose="020F0502020204030204" pitchFamily="34" charset="0"/>
-                      </a:endParaRPr>
-                    </a:p>
-                  </a:txBody>
-                  <a:tcPr marL="6350" marR="6350" marT="6350" marB="0" anchor="ctr"/>
-                </a:tc>
-                <a:tc>
-                  <a:txBody>
-                    <a:bodyPr/>
-                    <a:lstStyle/>
-                    <a:p>
-                      <a:pPr algn="l" rtl="0" fontAlgn="ctr"/>
-                      <a:r>
-                        <a:rPr lang="en-GB" sz="1600" u="none" strike="noStrike" dirty="0">
-                          <a:effectLst/>
-                        </a:rPr>
-                        <a:t>'genet' </a:t>
-                      </a:r>
-                      <a:endParaRPr lang="en-GB" sz="1600" b="0" i="0" u="none" strike="noStrike" dirty="0">
-                        <a:solidFill>
-                          <a:srgbClr val="000000"/>
-                        </a:solidFill>
-                        <a:effectLst/>
-                        <a:latin typeface="Calibri" panose="020F0502020204030204" pitchFamily="34" charset="0"/>
-                      </a:endParaRPr>
-                    </a:p>
-                  </a:txBody>
-                  <a:tcPr marL="6350" marR="6350" marT="6350" marB="0" anchor="ctr"/>
-                </a:tc>
-                <a:tc>
-                  <a:txBody>
-                    <a:bodyPr/>
-                    <a:lstStyle/>
-                    <a:p>
-                      <a:pPr algn="l" rtl="0" fontAlgn="ctr"/>
-                      <a:r>
-                        <a:rPr lang="en-GB" sz="1600" u="none" strike="noStrike" dirty="0">
-                          <a:effectLst/>
-                        </a:rPr>
-                        <a:t>'</a:t>
-                      </a:r>
-                      <a:r>
-                        <a:rPr lang="en-GB" sz="1600" u="none" strike="noStrike" dirty="0" err="1">
-                          <a:effectLst/>
-                        </a:rPr>
-                        <a:t>asd</a:t>
-                      </a:r>
-                      <a:r>
-                        <a:rPr lang="en-GB" sz="1600" u="none" strike="noStrike" dirty="0">
-                          <a:effectLst/>
-                        </a:rPr>
-                        <a:t>'</a:t>
-                      </a:r>
-                      <a:endParaRPr lang="en-GB" sz="1600" b="0" i="0" u="none" strike="noStrike" dirty="0">
-                        <a:solidFill>
-                          <a:srgbClr val="000000"/>
-                        </a:solidFill>
-                        <a:effectLst/>
-                        <a:latin typeface="Calibri" panose="020F0502020204030204" pitchFamily="34" charset="0"/>
-                      </a:endParaRPr>
-                    </a:p>
-                  </a:txBody>
-                  <a:tcPr marL="6350" marR="6350" marT="6350" marB="0" anchor="ctr"/>
-                </a:tc>
-                <a:tc>
-                  <a:txBody>
-                    <a:bodyPr/>
-                    <a:lstStyle/>
-                    <a:p>
-                      <a:pPr algn="l" rtl="0" fontAlgn="ctr"/>
-                      <a:r>
-                        <a:rPr lang="en-GB" sz="1600" u="none" strike="noStrike" dirty="0">
-                          <a:effectLst/>
-                        </a:rPr>
-                        <a:t>'</a:t>
-                      </a:r>
-                      <a:r>
-                        <a:rPr lang="en-GB" sz="1600" u="none" strike="noStrike" dirty="0" err="1">
-                          <a:effectLst/>
-                        </a:rPr>
-                        <a:t>studi</a:t>
-                      </a:r>
-                      <a:r>
-                        <a:rPr lang="en-GB" sz="1600" u="none" strike="noStrike" dirty="0">
-                          <a:effectLst/>
-                        </a:rPr>
-                        <a:t>'</a:t>
-                      </a:r>
-                      <a:endParaRPr lang="en-GB" sz="1600" b="0" i="0" u="none" strike="noStrike" dirty="0">
-                        <a:solidFill>
-                          <a:srgbClr val="000000"/>
-                        </a:solidFill>
-                        <a:effectLst/>
-                        <a:latin typeface="Calibri" panose="020F0502020204030204" pitchFamily="34" charset="0"/>
-                      </a:endParaRPr>
-                    </a:p>
-                  </a:txBody>
-                  <a:tcPr marL="6350" marR="6350" marT="6350" marB="0" anchor="ctr"/>
-                </a:tc>
-                <a:extLst>
-                  <a:ext uri="{0D108BD9-81ED-4DB2-BD59-A6C34878D82A}">
-                    <a16:rowId xmlns:a16="http://schemas.microsoft.com/office/drawing/2014/main" val="2284964353"/>
-                  </a:ext>
-                </a:extLst>
-              </a:tr>
-              <a:tr h="609600">
-                <a:tc>
-                  <a:txBody>
-                    <a:bodyPr/>
-                    <a:lstStyle/>
-                    <a:p>
-                      <a:pPr algn="l" rtl="0" fontAlgn="ctr"/>
-                      <a:r>
-                        <a:rPr lang="en-GB" sz="1600" u="none" strike="noStrike" dirty="0">
-                          <a:effectLst/>
-                        </a:rPr>
-                        <a:t>Count</a:t>
-                      </a:r>
-                      <a:endParaRPr lang="en-GB" sz="1600" b="1" i="0" u="none" strike="noStrike" dirty="0">
-                        <a:solidFill>
-                          <a:srgbClr val="FFFFFF"/>
-                        </a:solidFill>
-                        <a:effectLst/>
-                        <a:latin typeface="Calibri" panose="020F0502020204030204" pitchFamily="34" charset="0"/>
-                      </a:endParaRPr>
-                    </a:p>
-                  </a:txBody>
-                  <a:tcPr marL="6350" marR="6350" marT="6350" marB="0" anchor="ctr"/>
+                  <a:tcPr marL="7373" marR="7373" marT="7373" marB="0" anchor="ctr"/>
                 </a:tc>
                 <a:tc>
                   <a:txBody>
@@ -4681,278 +4626,58 @@
                     <a:p>
                       <a:pPr algn="ctr" rtl="0" fontAlgn="ctr"/>
                       <a:r>
-                        <a:rPr lang="en-GB" sz="1600" dirty="0"/>
-                        <a:t>1494</a:t>
-                      </a:r>
-                      <a:endParaRPr lang="en-GB" sz="1600" b="0" i="0" u="none" strike="noStrike" dirty="0">
-                        <a:solidFill>
-                          <a:srgbClr val="000000"/>
-                        </a:solidFill>
-                        <a:effectLst/>
-                        <a:latin typeface="Calibri" panose="020F0502020204030204" pitchFamily="34" charset="0"/>
-                      </a:endParaRPr>
+                        <a:rPr lang="en-GB" sz="2300" b="0" i="0" u="none" strike="noStrike" dirty="0">
+                          <a:solidFill>
+                            <a:srgbClr val="000000"/>
+                          </a:solidFill>
+                          <a:effectLst/>
+                          <a:latin typeface="Calibri" panose="020F0502020204030204" pitchFamily="34" charset="0"/>
+                        </a:rPr>
+                        <a:t>984</a:t>
+                      </a:r>
                     </a:p>
                   </a:txBody>
-                  <a:tcPr marL="6350" marR="6350" marT="6350" marB="0" anchor="ctr"/>
+                  <a:tcPr marL="7373" marR="7373" marT="7373" marB="0" anchor="ctr"/>
                 </a:tc>
                 <a:tc>
                   <a:txBody>
                     <a:bodyPr/>
                     <a:lstStyle/>
                     <a:p>
-                      <a:pPr algn="l" rtl="0" fontAlgn="ctr"/>
-                      <a:r>
-                        <a:rPr lang="en-GB" sz="1600" u="none" strike="noStrike" dirty="0">
-                          <a:effectLst/>
-                        </a:rPr>
-                        <a:t>876</a:t>
-                      </a:r>
-                      <a:endParaRPr lang="en-GB" sz="1600" b="0" i="0" u="none" strike="noStrike" dirty="0">
-                        <a:solidFill>
-                          <a:srgbClr val="000000"/>
-                        </a:solidFill>
-                        <a:effectLst/>
-                        <a:latin typeface="Calibri" panose="020F0502020204030204" pitchFamily="34" charset="0"/>
-                      </a:endParaRPr>
+                      <a:pPr algn="ctr" rtl="0" fontAlgn="ctr"/>
+                      <a:r>
+                        <a:rPr lang="en-GB" sz="2300" b="0" i="0" u="none" strike="noStrike" dirty="0">
+                          <a:solidFill>
+                            <a:srgbClr val="000000"/>
+                          </a:solidFill>
+                          <a:effectLst/>
+                          <a:latin typeface="Calibri" panose="020F0502020204030204" pitchFamily="34" charset="0"/>
+                        </a:rPr>
+                        <a:t>953</a:t>
+                      </a:r>
                     </a:p>
                   </a:txBody>
-                  <a:tcPr marL="6350" marR="6350" marT="6350" marB="0" anchor="ctr"/>
+                  <a:tcPr marL="7373" marR="7373" marT="7373" marB="0" anchor="ctr"/>
                 </a:tc>
                 <a:tc>
                   <a:txBody>
                     <a:bodyPr/>
                     <a:lstStyle/>
                     <a:p>
-                      <a:pPr algn="l" rtl="0" fontAlgn="ctr"/>
-                      <a:r>
-                        <a:rPr lang="en-GB" sz="1600" dirty="0"/>
-                        <a:t>820</a:t>
-                      </a:r>
-                      <a:endParaRPr lang="en-GB" sz="1600" b="0" i="0" u="none" strike="noStrike" dirty="0">
-                        <a:solidFill>
-                          <a:srgbClr val="000000"/>
-                        </a:solidFill>
-                        <a:effectLst/>
-                        <a:latin typeface="Calibri" panose="020F0502020204030204" pitchFamily="34" charset="0"/>
-                      </a:endParaRPr>
-                    </a:p>
-                  </a:txBody>
-                  <a:tcPr marL="6350" marR="6350" marT="6350" marB="0" anchor="ctr"/>
-                </a:tc>
-                <a:tc>
-                  <a:txBody>
-                    <a:bodyPr/>
-                    <a:lstStyle/>
-                    <a:p>
-                      <a:pPr algn="l" rtl="0" fontAlgn="ctr"/>
-                      <a:r>
-                        <a:rPr lang="en-GB" sz="1600" dirty="0"/>
-                        <a:t>788</a:t>
-                      </a:r>
-                      <a:endParaRPr lang="en-GB" sz="1600" b="0" i="0" u="none" strike="noStrike" dirty="0">
-                        <a:solidFill>
-                          <a:srgbClr val="000000"/>
-                        </a:solidFill>
-                        <a:effectLst/>
-                        <a:latin typeface="Calibri" panose="020F0502020204030204" pitchFamily="34" charset="0"/>
-                      </a:endParaRPr>
-                    </a:p>
-                  </a:txBody>
-                  <a:tcPr marL="6350" marR="6350" marT="6350" marB="0" anchor="ctr"/>
-                </a:tc>
-                <a:tc>
-                  <a:txBody>
-                    <a:bodyPr/>
-                    <a:lstStyle/>
-                    <a:p>
-                      <a:pPr algn="l" rtl="0" fontAlgn="ctr"/>
-                      <a:r>
-                        <a:rPr lang="en-GB" sz="1600" dirty="0"/>
-                        <a:t>738</a:t>
-                      </a:r>
-                      <a:endParaRPr lang="en-GB" sz="1600" b="0" i="0" u="none" strike="noStrike" dirty="0">
-                        <a:solidFill>
-                          <a:srgbClr val="000000"/>
-                        </a:solidFill>
-                        <a:effectLst/>
-                        <a:latin typeface="Calibri" panose="020F0502020204030204" pitchFamily="34" charset="0"/>
-                      </a:endParaRPr>
-                    </a:p>
-                  </a:txBody>
-                  <a:tcPr marL="6350" marR="6350" marT="6350" marB="0" anchor="ctr"/>
-                </a:tc>
-                <a:tc>
-                  <a:txBody>
-                    <a:bodyPr/>
-                    <a:lstStyle/>
-                    <a:p>
-                      <a:pPr algn="l" rtl="0" fontAlgn="ctr"/>
-                      <a:r>
-                        <a:rPr lang="en-GB" sz="1600" dirty="0"/>
-                        <a:t>728</a:t>
-                      </a:r>
-                      <a:endParaRPr lang="en-GB" sz="1600" b="0" i="0" u="none" strike="noStrike" dirty="0">
-                        <a:solidFill>
-                          <a:srgbClr val="000000"/>
-                        </a:solidFill>
-                        <a:effectLst/>
-                        <a:latin typeface="Calibri" panose="020F0502020204030204" pitchFamily="34" charset="0"/>
-                      </a:endParaRPr>
-                    </a:p>
-                  </a:txBody>
-                  <a:tcPr marL="6350" marR="6350" marT="6350" marB="0" anchor="ctr"/>
-                </a:tc>
-                <a:tc>
-                  <a:txBody>
-                    <a:bodyPr/>
-                    <a:lstStyle/>
-                    <a:p>
-                      <a:pPr algn="l" rtl="0" fontAlgn="ctr"/>
-                      <a:r>
-                        <a:rPr lang="en-GB" sz="1600" dirty="0"/>
-                        <a:t>696</a:t>
-                      </a:r>
-                      <a:endParaRPr lang="en-GB" sz="1600" b="0" i="0" u="none" strike="noStrike" dirty="0">
-                        <a:solidFill>
-                          <a:srgbClr val="000000"/>
-                        </a:solidFill>
-                        <a:effectLst/>
-                        <a:latin typeface="Calibri" panose="020F0502020204030204" pitchFamily="34" charset="0"/>
-                      </a:endParaRPr>
-                    </a:p>
-                  </a:txBody>
-                  <a:tcPr marL="6350" marR="6350" marT="6350" marB="0" anchor="ctr"/>
-                </a:tc>
-                <a:tc>
-                  <a:txBody>
-                    <a:bodyPr/>
-                    <a:lstStyle/>
-                    <a:p>
-                      <a:pPr algn="l" rtl="0" fontAlgn="ctr"/>
-                      <a:r>
-                        <a:rPr lang="en-GB" sz="1600" dirty="0"/>
-                        <a:t>673</a:t>
-                      </a:r>
-                      <a:endParaRPr lang="en-GB" sz="1600" b="0" i="0" u="none" strike="noStrike" dirty="0">
-                        <a:solidFill>
-                          <a:srgbClr val="000000"/>
-                        </a:solidFill>
-                        <a:effectLst/>
-                        <a:latin typeface="Calibri" panose="020F0502020204030204" pitchFamily="34" charset="0"/>
-                      </a:endParaRPr>
-                    </a:p>
-                  </a:txBody>
-                  <a:tcPr marL="6350" marR="6350" marT="6350" marB="0" anchor="ctr"/>
-                </a:tc>
-                <a:tc>
-                  <a:txBody>
-                    <a:bodyPr/>
-                    <a:lstStyle/>
-                    <a:p>
-                      <a:pPr algn="l" rtl="0" fontAlgn="ctr"/>
-                      <a:r>
-                        <a:rPr lang="en-GB" sz="1600" dirty="0"/>
-                        <a:t>145</a:t>
-                      </a:r>
-                      <a:endParaRPr lang="en-GB" sz="1600" b="0" i="0" u="none" strike="noStrike" dirty="0">
-                        <a:solidFill>
-                          <a:srgbClr val="000000"/>
-                        </a:solidFill>
-                        <a:effectLst/>
-                        <a:latin typeface="Calibri" panose="020F0502020204030204" pitchFamily="34" charset="0"/>
-                      </a:endParaRPr>
-                    </a:p>
-                  </a:txBody>
-                  <a:tcPr marL="6350" marR="6350" marT="6350" marB="0" anchor="ctr"/>
-                </a:tc>
-                <a:tc>
-                  <a:txBody>
-                    <a:bodyPr/>
-                    <a:lstStyle/>
-                    <a:p>
-                      <a:pPr algn="l" rtl="0" fontAlgn="ctr"/>
-                      <a:r>
-                        <a:rPr lang="en-GB" sz="1600" u="none" strike="noStrike" dirty="0">
-                          <a:effectLst/>
-                        </a:rPr>
-                        <a:t>646</a:t>
-                      </a:r>
-                      <a:endParaRPr lang="en-GB" sz="1600" b="0" i="0" u="none" strike="noStrike" dirty="0">
-                        <a:solidFill>
-                          <a:srgbClr val="000000"/>
-                        </a:solidFill>
-                        <a:effectLst/>
-                        <a:latin typeface="Calibri" panose="020F0502020204030204" pitchFamily="34" charset="0"/>
-                      </a:endParaRPr>
-                    </a:p>
-                  </a:txBody>
-                  <a:tcPr marL="6350" marR="6350" marT="6350" marB="0" anchor="ctr"/>
-                </a:tc>
-                <a:tc>
-                  <a:txBody>
-                    <a:bodyPr/>
-                    <a:lstStyle/>
-                    <a:p>
-                      <a:pPr algn="l" rtl="0" fontAlgn="ctr"/>
-                      <a:r>
-                        <a:rPr lang="en-GB" sz="1600" u="none" strike="noStrike" dirty="0">
-                          <a:effectLst/>
-                        </a:rPr>
-                        <a:t>634</a:t>
-                      </a:r>
-                      <a:endParaRPr lang="en-GB" sz="1600" b="0" i="0" u="none" strike="noStrike" dirty="0">
-                        <a:solidFill>
-                          <a:srgbClr val="000000"/>
-                        </a:solidFill>
-                        <a:effectLst/>
-                        <a:latin typeface="Calibri" panose="020F0502020204030204" pitchFamily="34" charset="0"/>
-                      </a:endParaRPr>
-                    </a:p>
-                  </a:txBody>
-                  <a:tcPr marL="6350" marR="6350" marT="6350" marB="0" anchor="ctr"/>
-                </a:tc>
-                <a:tc>
-                  <a:txBody>
-                    <a:bodyPr/>
-                    <a:lstStyle/>
-                    <a:p>
-                      <a:pPr algn="l" rtl="0" fontAlgn="ctr"/>
-                      <a:r>
-                        <a:rPr lang="en-GB" sz="1600" u="none" strike="noStrike" dirty="0">
-                          <a:effectLst/>
-                        </a:rPr>
-                        <a:t>628</a:t>
-                      </a:r>
-                      <a:endParaRPr lang="en-GB" sz="1600" b="0" i="0" u="none" strike="noStrike" dirty="0">
-                        <a:solidFill>
-                          <a:srgbClr val="000000"/>
-                        </a:solidFill>
-                        <a:effectLst/>
-                        <a:latin typeface="Calibri" panose="020F0502020204030204" pitchFamily="34" charset="0"/>
-                      </a:endParaRPr>
-                    </a:p>
-                  </a:txBody>
-                  <a:tcPr marL="6350" marR="6350" marT="6350" marB="0" anchor="ctr"/>
-                </a:tc>
-                <a:tc>
-                  <a:txBody>
-                    <a:bodyPr/>
-                    <a:lstStyle/>
-                    <a:p>
-                      <a:pPr algn="l" rtl="0" fontAlgn="ctr"/>
-                      <a:r>
-                        <a:rPr lang="en-GB" sz="1600" b="0" i="0" u="none" strike="noStrike" dirty="0">
+                      <a:pPr algn="ctr" rtl="0" fontAlgn="ctr"/>
+                      <a:r>
+                        <a:rPr lang="en-GB" sz="2300" b="0" i="0" u="none" strike="noStrike" dirty="0">
                           <a:solidFill>
                             <a:srgbClr val="000000"/>
                           </a:solidFill>
                           <a:effectLst/>
                           <a:latin typeface="Calibri" panose="020F0502020204030204" pitchFamily="34" charset="0"/>
                         </a:rPr>
-                        <a:t>606</a:t>
+                        <a:t>902</a:t>
                       </a:r>
                     </a:p>
                   </a:txBody>
-                  <a:tcPr marL="6350" marR="6350" marT="6350" marB="0" anchor="ctr"/>
+                  <a:tcPr marL="7373" marR="7373" marT="7373" marB="0" anchor="ctr"/>
                 </a:tc>
                 <a:extLst>
                   <a:ext uri="{0D108BD9-81ED-4DB2-BD59-A6C34878D82A}">
@@ -4977,7 +4702,114 @@
 </p:sld>
 </file>
 
-<file path=ppt/slides/slide2.xml><?xml version="1.0" encoding="utf-8"?>
+<file path=ppt/slides/slide3.xml><?xml version="1.0" encoding="utf-8"?>
+<p:sld xmlns:a="http://schemas.openxmlformats.org/drawingml/2006/main" xmlns:r="http://schemas.openxmlformats.org/officeDocument/2006/relationships" xmlns:p="http://schemas.openxmlformats.org/presentationml/2006/main">
+  <p:cSld>
+    <p:spTree>
+      <p:nvGrpSpPr>
+        <p:cNvPr id="1" name=""/>
+        <p:cNvGrpSpPr/>
+        <p:nvPr/>
+      </p:nvGrpSpPr>
+      <p:grpSpPr>
+        <a:xfrm>
+          <a:off x="0" y="0"/>
+          <a:ext cx="0" cy="0"/>
+          <a:chOff x="0" y="0"/>
+          <a:chExt cx="0" cy="0"/>
+        </a:xfrm>
+      </p:grpSpPr>
+      <p:sp>
+        <p:nvSpPr>
+          <p:cNvPr id="2" name="Title 1">
+            <a:extLst>
+              <a:ext uri="{FF2B5EF4-FFF2-40B4-BE49-F238E27FC236}">
+                <a16:creationId xmlns:a16="http://schemas.microsoft.com/office/drawing/2014/main" id="{B0DDF931-7DD0-998C-EFAB-8AC34FF753BA}"/>
+              </a:ext>
+            </a:extLst>
+          </p:cNvPr>
+          <p:cNvSpPr>
+            <a:spLocks noGrp="1"/>
+          </p:cNvSpPr>
+          <p:nvPr>
+            <p:ph type="title"/>
+          </p:nvPr>
+        </p:nvSpPr>
+        <p:spPr/>
+        <p:txBody>
+          <a:bodyPr/>
+          <a:lstStyle/>
+          <a:p>
+            <a:r>
+              <a:rPr lang="en-GB" dirty="0"/>
+              <a:t>Target word counts over the years</a:t>
+            </a:r>
+          </a:p>
+        </p:txBody>
+      </p:sp>
+      <p:pic>
+        <p:nvPicPr>
+          <p:cNvPr id="3074" name="Picture 2">
+            <a:extLst>
+              <a:ext uri="{FF2B5EF4-FFF2-40B4-BE49-F238E27FC236}">
+                <a16:creationId xmlns:a16="http://schemas.microsoft.com/office/drawing/2014/main" id="{C967FEC4-A1A7-9F37-B480-42E7E5119ABA}"/>
+              </a:ext>
+            </a:extLst>
+          </p:cNvPr>
+          <p:cNvPicPr>
+            <a:picLocks noGrp="1" noChangeAspect="1" noChangeArrowheads="1"/>
+          </p:cNvPicPr>
+          <p:nvPr>
+            <p:ph idx="1"/>
+          </p:nvPr>
+        </p:nvPicPr>
+        <p:blipFill>
+          <a:blip r:embed="rId2">
+            <a:extLst>
+              <a:ext uri="{28A0092B-C50C-407E-A947-70E740481C1C}">
+                <a14:useLocalDpi xmlns:a14="http://schemas.microsoft.com/office/drawing/2010/main" val="0"/>
+              </a:ext>
+            </a:extLst>
+          </a:blip>
+          <a:srcRect/>
+          <a:stretch>
+            <a:fillRect/>
+          </a:stretch>
+        </p:blipFill>
+        <p:spPr bwMode="auto">
+          <a:xfrm>
+            <a:off x="3535675" y="2026186"/>
+            <a:ext cx="5120650" cy="3950216"/>
+          </a:xfrm>
+          <a:prstGeom prst="rect">
+            <a:avLst/>
+          </a:prstGeom>
+          <a:noFill/>
+          <a:extLst>
+            <a:ext uri="{909E8E84-426E-40DD-AFC4-6F175D3DCCD1}">
+              <a14:hiddenFill xmlns:a14="http://schemas.microsoft.com/office/drawing/2010/main">
+                <a:solidFill>
+                  <a:srgbClr val="FFFFFF"/>
+                </a:solidFill>
+              </a14:hiddenFill>
+            </a:ext>
+          </a:extLst>
+        </p:spPr>
+      </p:pic>
+    </p:spTree>
+    <p:extLst>
+      <p:ext uri="{BB962C8B-B14F-4D97-AF65-F5344CB8AC3E}">
+        <p14:creationId xmlns:p14="http://schemas.microsoft.com/office/powerpoint/2010/main" val="2733749987"/>
+      </p:ext>
+    </p:extLst>
+  </p:cSld>
+  <p:clrMapOvr>
+    <a:masterClrMapping/>
+  </p:clrMapOvr>
+</p:sld>
+</file>
+
+<file path=ppt/slides/slide4.xml><?xml version="1.0" encoding="utf-8"?>
 <p:sld xmlns:a="http://schemas.openxmlformats.org/drawingml/2006/main" xmlns:r="http://schemas.openxmlformats.org/officeDocument/2006/relationships" xmlns:p="http://schemas.openxmlformats.org/presentationml/2006/main">
   <p:cSld>
     <p:spTree>

</xml_diff>

<commit_message>
JK updated slides with the latest counts, graphs, etc. that include 2004 but that don't double count 2016
</commit_message>
<xml_diff>
--- a/2023_Second_analysis/Slides/Results_slides.pptx
+++ b/2023_Second_analysis/Slides/Results_slides.pptx
@@ -8,7 +8,7 @@
     <p:sldId id="259" r:id="rId2"/>
     <p:sldId id="257" r:id="rId3"/>
     <p:sldId id="260" r:id="rId4"/>
-    <p:sldId id="258" r:id="rId5"/>
+    <p:sldId id="261" r:id="rId5"/>
   </p:sldIdLst>
   <p:sldSz cx="12192000" cy="6858000"/>
   <p:notesSz cx="6858000" cy="9144000"/>
@@ -4831,7 +4831,7 @@
           <p:cNvPr id="2" name="Title 1">
             <a:extLst>
               <a:ext uri="{FF2B5EF4-FFF2-40B4-BE49-F238E27FC236}">
-                <a16:creationId xmlns:a16="http://schemas.microsoft.com/office/drawing/2014/main" id="{FDA7A044-8ECD-AD58-AC61-3516A710C562}"/>
+                <a16:creationId xmlns:a16="http://schemas.microsoft.com/office/drawing/2014/main" id="{70A8A8F1-65C8-4E4C-765E-8CA705FF1FDD}"/>
               </a:ext>
             </a:extLst>
           </p:cNvPr>
@@ -4847,14 +4847,74 @@
           <a:bodyPr/>
           <a:lstStyle/>
           <a:p>
-            <a:endParaRPr lang="en-GB"/>
-          </a:p>
-        </p:txBody>
-      </p:sp>
+            <a:r>
+              <a:rPr lang="en-GB" dirty="0"/>
+              <a:t>Person-first and </a:t>
+            </a:r>
+            <a:r>
+              <a:rPr lang="en-GB"/>
+              <a:t>Identity-first counts by </a:t>
+            </a:r>
+            <a:r>
+              <a:rPr lang="en-GB" dirty="0"/>
+              <a:t>year</a:t>
+            </a:r>
+          </a:p>
+        </p:txBody>
+      </p:sp>
+      <p:pic>
+        <p:nvPicPr>
+          <p:cNvPr id="1026" name="Picture 2">
+            <a:extLst>
+              <a:ext uri="{FF2B5EF4-FFF2-40B4-BE49-F238E27FC236}">
+                <a16:creationId xmlns:a16="http://schemas.microsoft.com/office/drawing/2014/main" id="{E788A650-4185-1543-D660-EEC1A34940A0}"/>
+              </a:ext>
+            </a:extLst>
+          </p:cNvPr>
+          <p:cNvPicPr>
+            <a:picLocks noGrp="1" noChangeAspect="1" noChangeArrowheads="1"/>
+          </p:cNvPicPr>
+          <p:nvPr>
+            <p:ph idx="1"/>
+          </p:nvPr>
+        </p:nvPicPr>
+        <p:blipFill>
+          <a:blip r:embed="rId2">
+            <a:extLst>
+              <a:ext uri="{28A0092B-C50C-407E-A947-70E740481C1C}">
+                <a14:useLocalDpi xmlns:a14="http://schemas.microsoft.com/office/drawing/2010/main" val="0"/>
+              </a:ext>
+            </a:extLst>
+          </a:blip>
+          <a:srcRect/>
+          <a:stretch>
+            <a:fillRect/>
+          </a:stretch>
+        </p:blipFill>
+        <p:spPr bwMode="auto">
+          <a:xfrm>
+            <a:off x="3613399" y="2026186"/>
+            <a:ext cx="4965202" cy="3950216"/>
+          </a:xfrm>
+          <a:prstGeom prst="rect">
+            <a:avLst/>
+          </a:prstGeom>
+          <a:noFill/>
+          <a:extLst>
+            <a:ext uri="{909E8E84-426E-40DD-AFC4-6F175D3DCCD1}">
+              <a14:hiddenFill xmlns:a14="http://schemas.microsoft.com/office/drawing/2010/main">
+                <a:solidFill>
+                  <a:srgbClr val="FFFFFF"/>
+                </a:solidFill>
+              </a14:hiddenFill>
+            </a:ext>
+          </a:extLst>
+        </p:spPr>
+      </p:pic>
     </p:spTree>
     <p:extLst>
       <p:ext uri="{BB962C8B-B14F-4D97-AF65-F5344CB8AC3E}">
-        <p14:creationId xmlns:p14="http://schemas.microsoft.com/office/powerpoint/2010/main" val="4056573251"/>
+        <p14:creationId xmlns:p14="http://schemas.microsoft.com/office/powerpoint/2010/main" val="1981281236"/>
       </p:ext>
     </p:extLst>
   </p:cSld>

</xml_diff>